<commit_message>
Adding review and updating with new changes in presentation
</commit_message>
<xml_diff>
--- a/Thesis-Presentation_v1.pptx
+++ b/Thesis-Presentation_v1.pptx
@@ -7,20 +7,20 @@
     <p:sldMasterId id="2147483696" r:id="rId3"/>
   </p:sldMasterIdLst>
   <p:notesMasterIdLst>
-    <p:notesMasterId r:id="rId23"/>
+    <p:notesMasterId r:id="rId25"/>
   </p:notesMasterIdLst>
   <p:sldIdLst>
     <p:sldId id="256" r:id="rId4"/>
-    <p:sldId id="292" r:id="rId5"/>
+    <p:sldId id="334" r:id="rId5"/>
     <p:sldId id="310" r:id="rId6"/>
     <p:sldId id="319" r:id="rId7"/>
     <p:sldId id="320" r:id="rId8"/>
     <p:sldId id="321" r:id="rId9"/>
-    <p:sldId id="316" r:id="rId10"/>
+    <p:sldId id="339" r:id="rId10"/>
     <p:sldId id="323" r:id="rId11"/>
     <p:sldId id="322" r:id="rId12"/>
-    <p:sldId id="313" r:id="rId13"/>
-    <p:sldId id="314" r:id="rId14"/>
+    <p:sldId id="337" r:id="rId13"/>
+    <p:sldId id="313" r:id="rId14"/>
     <p:sldId id="315" r:id="rId15"/>
     <p:sldId id="324" r:id="rId16"/>
     <p:sldId id="325" r:id="rId17"/>
@@ -28,7 +28,9 @@
     <p:sldId id="326" r:id="rId19"/>
     <p:sldId id="328" r:id="rId20"/>
     <p:sldId id="327" r:id="rId21"/>
-    <p:sldId id="309" r:id="rId22"/>
+    <p:sldId id="336" r:id="rId22"/>
+    <p:sldId id="335" r:id="rId23"/>
+    <p:sldId id="309" r:id="rId24"/>
   </p:sldIdLst>
   <p:sldSz cx="9144000" cy="6858000" type="screen4x3"/>
   <p:notesSz cx="6858000" cy="9144000"/>
@@ -159,7 +161,7 @@
   </p:defaultTextStyle>
   <p:extLst>
     <p:ext uri="{EFAFB233-063F-42B5-8137-9DF3F51BA10A}">
-      <p15:sldGuideLst xmlns="" xmlns:p15="http://schemas.microsoft.com/office/powerpoint/2012/main">
+      <p15:sldGuideLst xmlns:p15="http://schemas.microsoft.com/office/powerpoint/2012/main" xmlns="">
         <p15:guide id="1" orient="horz" pos="164">
           <p15:clr>
             <a:srgbClr val="A4A3A4"/>
@@ -320,7 +322,7 @@
               <a:pPr>
                 <a:defRPr/>
               </a:pPr>
-              <a:t>28/10/15</a:t>
+              <a:t>29/10/15</a:t>
             </a:fld>
             <a:endParaRPr lang="en-AU"/>
           </a:p>
@@ -771,6 +773,804 @@
     <p:extLst>
       <p:ext uri="{BB962C8B-B14F-4D97-AF65-F5344CB8AC3E}">
         <p14:creationId xmlns:p14="http://schemas.microsoft.com/office/powerpoint/2010/main" val="3976123195"/>
+      </p:ext>
+    </p:extLst>
+  </p:cSld>
+  <p:clrMapOvr>
+    <a:masterClrMapping/>
+  </p:clrMapOvr>
+</p:notes>
+</file>
+
+<file path=ppt/notesSlides/notesSlide2.xml><?xml version="1.0" encoding="utf-8"?>
+<p:notes xmlns:a="http://schemas.openxmlformats.org/drawingml/2006/main" xmlns:r="http://schemas.openxmlformats.org/officeDocument/2006/relationships" xmlns:p="http://schemas.openxmlformats.org/presentationml/2006/main">
+  <p:cSld>
+    <p:spTree>
+      <p:nvGrpSpPr>
+        <p:cNvPr id="1" name=""/>
+        <p:cNvGrpSpPr/>
+        <p:nvPr/>
+      </p:nvGrpSpPr>
+      <p:grpSpPr>
+        <a:xfrm>
+          <a:off x="0" y="0"/>
+          <a:ext cx="0" cy="0"/>
+          <a:chOff x="0" y="0"/>
+          <a:chExt cx="0" cy="0"/>
+        </a:xfrm>
+      </p:grpSpPr>
+      <p:sp>
+        <p:nvSpPr>
+          <p:cNvPr id="2" name="Slide Image Placeholder 1"/>
+          <p:cNvSpPr>
+            <a:spLocks noGrp="1" noRot="1" noChangeAspect="1"/>
+          </p:cNvSpPr>
+          <p:nvPr>
+            <p:ph type="sldImg"/>
+          </p:nvPr>
+        </p:nvSpPr>
+        <p:spPr/>
+      </p:sp>
+      <p:sp>
+        <p:nvSpPr>
+          <p:cNvPr id="3" name="Notes Placeholder 2"/>
+          <p:cNvSpPr>
+            <a:spLocks noGrp="1"/>
+          </p:cNvSpPr>
+          <p:nvPr>
+            <p:ph type="body" idx="1"/>
+          </p:nvPr>
+        </p:nvSpPr>
+        <p:spPr>
+          <a:xfrm>
+            <a:off x="699606" y="4343400"/>
+            <a:ext cx="5486400" cy="4114800"/>
+          </a:xfrm>
+        </p:spPr>
+        <p:txBody>
+          <a:bodyPr/>
+          <a:lstStyle/>
+          <a:p>
+            <a:r>
+              <a:rPr lang="en-US" dirty="0" smtClean="0"/>
+              <a:t>No need for any preprocessing</a:t>
+            </a:r>
+          </a:p>
+          <a:p>
+            <a:endParaRPr lang="en-US" dirty="0"/>
+          </a:p>
+          <a:p>
+            <a:r>
+              <a:rPr lang="en-US" dirty="0" smtClean="0"/>
+              <a:t>Benchmarking other classifications</a:t>
+            </a:r>
+          </a:p>
+          <a:p>
+            <a:endParaRPr lang="en-US" dirty="0"/>
+          </a:p>
+          <a:p>
+            <a:r>
+              <a:rPr lang="en-US" dirty="0" smtClean="0"/>
+              <a:t>1M x 1M =&gt; 10</a:t>
+            </a:r>
+            <a:r>
+              <a:rPr lang="en-US" baseline="30000" dirty="0" smtClean="0"/>
+              <a:t>12</a:t>
+            </a:r>
+            <a:r>
+              <a:rPr lang="en-US" dirty="0" smtClean="0"/>
+              <a:t> computation</a:t>
+            </a:r>
+          </a:p>
+          <a:p>
+            <a:endParaRPr lang="en-US" dirty="0"/>
+          </a:p>
+        </p:txBody>
+      </p:sp>
+      <p:sp>
+        <p:nvSpPr>
+          <p:cNvPr id="4" name="Slide Number Placeholder 3"/>
+          <p:cNvSpPr>
+            <a:spLocks noGrp="1"/>
+          </p:cNvSpPr>
+          <p:nvPr>
+            <p:ph type="sldNum" sz="quarter" idx="10"/>
+          </p:nvPr>
+        </p:nvSpPr>
+        <p:spPr/>
+        <p:txBody>
+          <a:bodyPr/>
+          <a:lstStyle/>
+          <a:p>
+            <a:pPr>
+              <a:defRPr/>
+            </a:pPr>
+            <a:fld id="{7F095C4C-A269-498F-B608-25A42E521BF5}" type="slidenum">
+              <a:rPr lang="en-AU" smtClean="0"/>
+              <a:pPr>
+                <a:defRPr/>
+              </a:pPr>
+              <a:t>3</a:t>
+            </a:fld>
+            <a:endParaRPr lang="en-AU"/>
+          </a:p>
+        </p:txBody>
+      </p:sp>
+    </p:spTree>
+    <p:extLst>
+      <p:ext uri="{BB962C8B-B14F-4D97-AF65-F5344CB8AC3E}">
+        <p14:creationId xmlns:p14="http://schemas.microsoft.com/office/powerpoint/2010/main" val="3352304672"/>
+      </p:ext>
+    </p:extLst>
+  </p:cSld>
+  <p:clrMapOvr>
+    <a:masterClrMapping/>
+  </p:clrMapOvr>
+</p:notes>
+</file>
+
+<file path=ppt/notesSlides/notesSlide3.xml><?xml version="1.0" encoding="utf-8"?>
+<p:notes xmlns:a="http://schemas.openxmlformats.org/drawingml/2006/main" xmlns:r="http://schemas.openxmlformats.org/officeDocument/2006/relationships" xmlns:p="http://schemas.openxmlformats.org/presentationml/2006/main">
+  <p:cSld>
+    <p:spTree>
+      <p:nvGrpSpPr>
+        <p:cNvPr id="1" name=""/>
+        <p:cNvGrpSpPr/>
+        <p:nvPr/>
+      </p:nvGrpSpPr>
+      <p:grpSpPr>
+        <a:xfrm>
+          <a:off x="0" y="0"/>
+          <a:ext cx="0" cy="0"/>
+          <a:chOff x="0" y="0"/>
+          <a:chExt cx="0" cy="0"/>
+        </a:xfrm>
+      </p:grpSpPr>
+      <p:sp>
+        <p:nvSpPr>
+          <p:cNvPr id="2" name="Slide Image Placeholder 1"/>
+          <p:cNvSpPr>
+            <a:spLocks noGrp="1" noRot="1" noChangeAspect="1"/>
+          </p:cNvSpPr>
+          <p:nvPr>
+            <p:ph type="sldImg"/>
+          </p:nvPr>
+        </p:nvSpPr>
+        <p:spPr/>
+      </p:sp>
+      <p:sp>
+        <p:nvSpPr>
+          <p:cNvPr id="3" name="Notes Placeholder 2"/>
+          <p:cNvSpPr>
+            <a:spLocks noGrp="1"/>
+          </p:cNvSpPr>
+          <p:nvPr>
+            <p:ph type="body" idx="1"/>
+          </p:nvPr>
+        </p:nvSpPr>
+        <p:spPr/>
+        <p:txBody>
+          <a:bodyPr/>
+          <a:lstStyle/>
+          <a:p>
+            <a:r>
+              <a:rPr lang="en-US" dirty="0" smtClean="0"/>
+              <a:t>Does not reduce computational complexity but we leverage the warehouse scale machine availability , use them for parallel computation</a:t>
+            </a:r>
+            <a:endParaRPr lang="en-US" dirty="0"/>
+          </a:p>
+        </p:txBody>
+      </p:sp>
+      <p:sp>
+        <p:nvSpPr>
+          <p:cNvPr id="4" name="Slide Number Placeholder 3"/>
+          <p:cNvSpPr>
+            <a:spLocks noGrp="1"/>
+          </p:cNvSpPr>
+          <p:nvPr>
+            <p:ph type="sldNum" sz="quarter" idx="10"/>
+          </p:nvPr>
+        </p:nvSpPr>
+        <p:spPr/>
+        <p:txBody>
+          <a:bodyPr/>
+          <a:lstStyle/>
+          <a:p>
+            <a:pPr>
+              <a:defRPr/>
+            </a:pPr>
+            <a:fld id="{7F095C4C-A269-498F-B608-25A42E521BF5}" type="slidenum">
+              <a:rPr lang="en-AU" smtClean="0"/>
+              <a:pPr>
+                <a:defRPr/>
+              </a:pPr>
+              <a:t>4</a:t>
+            </a:fld>
+            <a:endParaRPr lang="en-AU"/>
+          </a:p>
+        </p:txBody>
+      </p:sp>
+    </p:spTree>
+    <p:extLst>
+      <p:ext uri="{BB962C8B-B14F-4D97-AF65-F5344CB8AC3E}">
+        <p14:creationId xmlns:p14="http://schemas.microsoft.com/office/powerpoint/2010/main" val="412892738"/>
+      </p:ext>
+    </p:extLst>
+  </p:cSld>
+  <p:clrMapOvr>
+    <a:masterClrMapping/>
+  </p:clrMapOvr>
+</p:notes>
+</file>
+
+<file path=ppt/notesSlides/notesSlide4.xml><?xml version="1.0" encoding="utf-8"?>
+<p:notes xmlns:a="http://schemas.openxmlformats.org/drawingml/2006/main" xmlns:r="http://schemas.openxmlformats.org/officeDocument/2006/relationships" xmlns:p="http://schemas.openxmlformats.org/presentationml/2006/main">
+  <p:cSld>
+    <p:spTree>
+      <p:nvGrpSpPr>
+        <p:cNvPr id="1" name=""/>
+        <p:cNvGrpSpPr/>
+        <p:nvPr/>
+      </p:nvGrpSpPr>
+      <p:grpSpPr>
+        <a:xfrm>
+          <a:off x="0" y="0"/>
+          <a:ext cx="0" cy="0"/>
+          <a:chOff x="0" y="0"/>
+          <a:chExt cx="0" cy="0"/>
+        </a:xfrm>
+      </p:grpSpPr>
+      <p:sp>
+        <p:nvSpPr>
+          <p:cNvPr id="2" name="Slide Image Placeholder 1"/>
+          <p:cNvSpPr>
+            <a:spLocks noGrp="1" noRot="1" noChangeAspect="1"/>
+          </p:cNvSpPr>
+          <p:nvPr>
+            <p:ph type="sldImg"/>
+          </p:nvPr>
+        </p:nvSpPr>
+        <p:spPr/>
+      </p:sp>
+      <p:sp>
+        <p:nvSpPr>
+          <p:cNvPr id="3" name="Notes Placeholder 2"/>
+          <p:cNvSpPr>
+            <a:spLocks noGrp="1"/>
+          </p:cNvSpPr>
+          <p:nvPr>
+            <p:ph type="body" idx="1"/>
+          </p:nvPr>
+        </p:nvSpPr>
+        <p:spPr/>
+        <p:txBody>
+          <a:bodyPr/>
+          <a:lstStyle/>
+          <a:p>
+            <a:endParaRPr lang="en-US"/>
+          </a:p>
+        </p:txBody>
+      </p:sp>
+      <p:sp>
+        <p:nvSpPr>
+          <p:cNvPr id="4" name="Slide Number Placeholder 3"/>
+          <p:cNvSpPr>
+            <a:spLocks noGrp="1"/>
+          </p:cNvSpPr>
+          <p:nvPr>
+            <p:ph type="sldNum" sz="quarter" idx="10"/>
+          </p:nvPr>
+        </p:nvSpPr>
+        <p:spPr/>
+        <p:txBody>
+          <a:bodyPr/>
+          <a:lstStyle/>
+          <a:p>
+            <a:pPr>
+              <a:defRPr/>
+            </a:pPr>
+            <a:fld id="{7F095C4C-A269-498F-B608-25A42E521BF5}" type="slidenum">
+              <a:rPr lang="en-AU" smtClean="0"/>
+              <a:pPr>
+                <a:defRPr/>
+              </a:pPr>
+              <a:t>5</a:t>
+            </a:fld>
+            <a:endParaRPr lang="en-AU"/>
+          </a:p>
+        </p:txBody>
+      </p:sp>
+    </p:spTree>
+    <p:extLst>
+      <p:ext uri="{BB962C8B-B14F-4D97-AF65-F5344CB8AC3E}">
+        <p14:creationId xmlns:p14="http://schemas.microsoft.com/office/powerpoint/2010/main" val="1060680772"/>
+      </p:ext>
+    </p:extLst>
+  </p:cSld>
+  <p:clrMapOvr>
+    <a:masterClrMapping/>
+  </p:clrMapOvr>
+</p:notes>
+</file>
+
+<file path=ppt/notesSlides/notesSlide5.xml><?xml version="1.0" encoding="utf-8"?>
+<p:notes xmlns:a="http://schemas.openxmlformats.org/drawingml/2006/main" xmlns:r="http://schemas.openxmlformats.org/officeDocument/2006/relationships" xmlns:p="http://schemas.openxmlformats.org/presentationml/2006/main">
+  <p:cSld>
+    <p:spTree>
+      <p:nvGrpSpPr>
+        <p:cNvPr id="1" name=""/>
+        <p:cNvGrpSpPr/>
+        <p:nvPr/>
+      </p:nvGrpSpPr>
+      <p:grpSpPr>
+        <a:xfrm>
+          <a:off x="0" y="0"/>
+          <a:ext cx="0" cy="0"/>
+          <a:chOff x="0" y="0"/>
+          <a:chExt cx="0" cy="0"/>
+        </a:xfrm>
+      </p:grpSpPr>
+      <p:sp>
+        <p:nvSpPr>
+          <p:cNvPr id="2" name="Slide Image Placeholder 1"/>
+          <p:cNvSpPr>
+            <a:spLocks noGrp="1" noRot="1" noChangeAspect="1"/>
+          </p:cNvSpPr>
+          <p:nvPr>
+            <p:ph type="sldImg"/>
+          </p:nvPr>
+        </p:nvSpPr>
+        <p:spPr/>
+      </p:sp>
+      <p:sp>
+        <p:nvSpPr>
+          <p:cNvPr id="3" name="Notes Placeholder 2"/>
+          <p:cNvSpPr>
+            <a:spLocks noGrp="1"/>
+          </p:cNvSpPr>
+          <p:nvPr>
+            <p:ph type="body" idx="1"/>
+          </p:nvPr>
+        </p:nvSpPr>
+        <p:spPr/>
+        <p:txBody>
+          <a:bodyPr/>
+          <a:lstStyle/>
+          <a:p>
+            <a:endParaRPr lang="en-US"/>
+          </a:p>
+        </p:txBody>
+      </p:sp>
+      <p:sp>
+        <p:nvSpPr>
+          <p:cNvPr id="4" name="Slide Number Placeholder 3"/>
+          <p:cNvSpPr>
+            <a:spLocks noGrp="1"/>
+          </p:cNvSpPr>
+          <p:nvPr>
+            <p:ph type="sldNum" sz="quarter" idx="10"/>
+          </p:nvPr>
+        </p:nvSpPr>
+        <p:spPr/>
+        <p:txBody>
+          <a:bodyPr/>
+          <a:lstStyle/>
+          <a:p>
+            <a:pPr>
+              <a:defRPr/>
+            </a:pPr>
+            <a:fld id="{7F095C4C-A269-498F-B608-25A42E521BF5}" type="slidenum">
+              <a:rPr lang="en-AU" smtClean="0"/>
+              <a:pPr>
+                <a:defRPr/>
+              </a:pPr>
+              <a:t>6</a:t>
+            </a:fld>
+            <a:endParaRPr lang="en-AU"/>
+          </a:p>
+        </p:txBody>
+      </p:sp>
+    </p:spTree>
+    <p:extLst>
+      <p:ext uri="{BB962C8B-B14F-4D97-AF65-F5344CB8AC3E}">
+        <p14:creationId xmlns:p14="http://schemas.microsoft.com/office/powerpoint/2010/main" val="4144276699"/>
+      </p:ext>
+    </p:extLst>
+  </p:cSld>
+  <p:clrMapOvr>
+    <a:masterClrMapping/>
+  </p:clrMapOvr>
+</p:notes>
+</file>
+
+<file path=ppt/notesSlides/notesSlide6.xml><?xml version="1.0" encoding="utf-8"?>
+<p:notes xmlns:a="http://schemas.openxmlformats.org/drawingml/2006/main" xmlns:r="http://schemas.openxmlformats.org/officeDocument/2006/relationships" xmlns:p="http://schemas.openxmlformats.org/presentationml/2006/main">
+  <p:cSld>
+    <p:spTree>
+      <p:nvGrpSpPr>
+        <p:cNvPr id="1" name=""/>
+        <p:cNvGrpSpPr/>
+        <p:nvPr/>
+      </p:nvGrpSpPr>
+      <p:grpSpPr>
+        <a:xfrm>
+          <a:off x="0" y="0"/>
+          <a:ext cx="0" cy="0"/>
+          <a:chOff x="0" y="0"/>
+          <a:chExt cx="0" cy="0"/>
+        </a:xfrm>
+      </p:grpSpPr>
+      <p:sp>
+        <p:nvSpPr>
+          <p:cNvPr id="2" name="Slide Image Placeholder 1"/>
+          <p:cNvSpPr>
+            <a:spLocks noGrp="1" noRot="1" noChangeAspect="1"/>
+          </p:cNvSpPr>
+          <p:nvPr>
+            <p:ph type="sldImg"/>
+          </p:nvPr>
+        </p:nvSpPr>
+        <p:spPr/>
+      </p:sp>
+      <p:sp>
+        <p:nvSpPr>
+          <p:cNvPr id="3" name="Notes Placeholder 2"/>
+          <p:cNvSpPr>
+            <a:spLocks noGrp="1"/>
+          </p:cNvSpPr>
+          <p:nvPr>
+            <p:ph type="body" idx="1"/>
+          </p:nvPr>
+        </p:nvSpPr>
+        <p:spPr/>
+        <p:txBody>
+          <a:bodyPr/>
+          <a:lstStyle/>
+          <a:p>
+            <a:endParaRPr lang="en-US"/>
+          </a:p>
+        </p:txBody>
+      </p:sp>
+      <p:sp>
+        <p:nvSpPr>
+          <p:cNvPr id="4" name="Slide Number Placeholder 3"/>
+          <p:cNvSpPr>
+            <a:spLocks noGrp="1"/>
+          </p:cNvSpPr>
+          <p:nvPr>
+            <p:ph type="sldNum" sz="quarter" idx="10"/>
+          </p:nvPr>
+        </p:nvSpPr>
+        <p:spPr/>
+        <p:txBody>
+          <a:bodyPr/>
+          <a:lstStyle/>
+          <a:p>
+            <a:pPr>
+              <a:defRPr/>
+            </a:pPr>
+            <a:fld id="{7F095C4C-A269-498F-B608-25A42E521BF5}" type="slidenum">
+              <a:rPr lang="en-AU" smtClean="0"/>
+              <a:pPr>
+                <a:defRPr/>
+              </a:pPr>
+              <a:t>8</a:t>
+            </a:fld>
+            <a:endParaRPr lang="en-AU"/>
+          </a:p>
+        </p:txBody>
+      </p:sp>
+    </p:spTree>
+    <p:extLst>
+      <p:ext uri="{BB962C8B-B14F-4D97-AF65-F5344CB8AC3E}">
+        <p14:creationId xmlns:p14="http://schemas.microsoft.com/office/powerpoint/2010/main" val="1039900376"/>
+      </p:ext>
+    </p:extLst>
+  </p:cSld>
+  <p:clrMapOvr>
+    <a:masterClrMapping/>
+  </p:clrMapOvr>
+</p:notes>
+</file>
+
+<file path=ppt/notesSlides/notesSlide7.xml><?xml version="1.0" encoding="utf-8"?>
+<p:notes xmlns:a="http://schemas.openxmlformats.org/drawingml/2006/main" xmlns:r="http://schemas.openxmlformats.org/officeDocument/2006/relationships" xmlns:p="http://schemas.openxmlformats.org/presentationml/2006/main">
+  <p:cSld>
+    <p:spTree>
+      <p:nvGrpSpPr>
+        <p:cNvPr id="1" name=""/>
+        <p:cNvGrpSpPr/>
+        <p:nvPr/>
+      </p:nvGrpSpPr>
+      <p:grpSpPr>
+        <a:xfrm>
+          <a:off x="0" y="0"/>
+          <a:ext cx="0" cy="0"/>
+          <a:chOff x="0" y="0"/>
+          <a:chExt cx="0" cy="0"/>
+        </a:xfrm>
+      </p:grpSpPr>
+      <p:sp>
+        <p:nvSpPr>
+          <p:cNvPr id="2" name="Slide Image Placeholder 1"/>
+          <p:cNvSpPr>
+            <a:spLocks noGrp="1" noRot="1" noChangeAspect="1"/>
+          </p:cNvSpPr>
+          <p:nvPr>
+            <p:ph type="sldImg"/>
+          </p:nvPr>
+        </p:nvSpPr>
+        <p:spPr/>
+      </p:sp>
+      <p:sp>
+        <p:nvSpPr>
+          <p:cNvPr id="3" name="Notes Placeholder 2"/>
+          <p:cNvSpPr>
+            <a:spLocks noGrp="1"/>
+          </p:cNvSpPr>
+          <p:nvPr>
+            <p:ph type="body" idx="1"/>
+          </p:nvPr>
+        </p:nvSpPr>
+        <p:spPr/>
+        <p:txBody>
+          <a:bodyPr/>
+          <a:lstStyle/>
+          <a:p>
+            <a:endParaRPr lang="en-US"/>
+          </a:p>
+        </p:txBody>
+      </p:sp>
+      <p:sp>
+        <p:nvSpPr>
+          <p:cNvPr id="4" name="Slide Number Placeholder 3"/>
+          <p:cNvSpPr>
+            <a:spLocks noGrp="1"/>
+          </p:cNvSpPr>
+          <p:nvPr>
+            <p:ph type="sldNum" sz="quarter" idx="10"/>
+          </p:nvPr>
+        </p:nvSpPr>
+        <p:spPr/>
+        <p:txBody>
+          <a:bodyPr/>
+          <a:lstStyle/>
+          <a:p>
+            <a:pPr>
+              <a:defRPr/>
+            </a:pPr>
+            <a:fld id="{7F095C4C-A269-498F-B608-25A42E521BF5}" type="slidenum">
+              <a:rPr lang="en-AU" smtClean="0"/>
+              <a:pPr>
+                <a:defRPr/>
+              </a:pPr>
+              <a:t>9</a:t>
+            </a:fld>
+            <a:endParaRPr lang="en-AU"/>
+          </a:p>
+        </p:txBody>
+      </p:sp>
+    </p:spTree>
+    <p:extLst>
+      <p:ext uri="{BB962C8B-B14F-4D97-AF65-F5344CB8AC3E}">
+        <p14:creationId xmlns:p14="http://schemas.microsoft.com/office/powerpoint/2010/main" val="1991781845"/>
+      </p:ext>
+    </p:extLst>
+  </p:cSld>
+  <p:clrMapOvr>
+    <a:masterClrMapping/>
+  </p:clrMapOvr>
+</p:notes>
+</file>
+
+<file path=ppt/notesSlides/notesSlide8.xml><?xml version="1.0" encoding="utf-8"?>
+<p:notes xmlns:a="http://schemas.openxmlformats.org/drawingml/2006/main" xmlns:r="http://schemas.openxmlformats.org/officeDocument/2006/relationships" xmlns:p="http://schemas.openxmlformats.org/presentationml/2006/main">
+  <p:cSld>
+    <p:spTree>
+      <p:nvGrpSpPr>
+        <p:cNvPr id="1" name=""/>
+        <p:cNvGrpSpPr/>
+        <p:nvPr/>
+      </p:nvGrpSpPr>
+      <p:grpSpPr>
+        <a:xfrm>
+          <a:off x="0" y="0"/>
+          <a:ext cx="0" cy="0"/>
+          <a:chOff x="0" y="0"/>
+          <a:chExt cx="0" cy="0"/>
+        </a:xfrm>
+      </p:grpSpPr>
+      <p:sp>
+        <p:nvSpPr>
+          <p:cNvPr id="2" name="Slide Image Placeholder 1"/>
+          <p:cNvSpPr>
+            <a:spLocks noGrp="1" noRot="1" noChangeAspect="1"/>
+          </p:cNvSpPr>
+          <p:nvPr>
+            <p:ph type="sldImg"/>
+          </p:nvPr>
+        </p:nvSpPr>
+        <p:spPr/>
+      </p:sp>
+      <p:sp>
+        <p:nvSpPr>
+          <p:cNvPr id="3" name="Notes Placeholder 2"/>
+          <p:cNvSpPr>
+            <a:spLocks noGrp="1"/>
+          </p:cNvSpPr>
+          <p:nvPr>
+            <p:ph type="body" idx="1"/>
+          </p:nvPr>
+        </p:nvSpPr>
+        <p:spPr/>
+        <p:txBody>
+          <a:bodyPr/>
+          <a:lstStyle/>
+          <a:p>
+            <a:r>
+              <a:rPr lang="en-US" dirty="0" smtClean="0"/>
+              <a:t>We have partition so that we can run operations like “map” in parallel</a:t>
+            </a:r>
+          </a:p>
+          <a:p>
+            <a:endParaRPr lang="en-US" dirty="0"/>
+          </a:p>
+          <a:p>
+            <a:r>
+              <a:rPr lang="en-US" dirty="0"/>
+              <a:t>Partition id x in R and S dataset will be </a:t>
+            </a:r>
+            <a:r>
+              <a:rPr lang="en-US" dirty="0" err="1"/>
+              <a:t>colocated</a:t>
+            </a:r>
+            <a:r>
+              <a:rPr lang="en-US" dirty="0"/>
+              <a:t>. This avoids lots of shuffle</a:t>
+            </a:r>
+          </a:p>
+          <a:p>
+            <a:endParaRPr lang="en-US" dirty="0"/>
+          </a:p>
+        </p:txBody>
+      </p:sp>
+      <p:sp>
+        <p:nvSpPr>
+          <p:cNvPr id="4" name="Slide Number Placeholder 3"/>
+          <p:cNvSpPr>
+            <a:spLocks noGrp="1"/>
+          </p:cNvSpPr>
+          <p:nvPr>
+            <p:ph type="sldNum" sz="quarter" idx="10"/>
+          </p:nvPr>
+        </p:nvSpPr>
+        <p:spPr/>
+        <p:txBody>
+          <a:bodyPr/>
+          <a:lstStyle/>
+          <a:p>
+            <a:pPr>
+              <a:defRPr/>
+            </a:pPr>
+            <a:fld id="{7F095C4C-A269-498F-B608-25A42E521BF5}" type="slidenum">
+              <a:rPr lang="en-AU" smtClean="0"/>
+              <a:pPr>
+                <a:defRPr/>
+              </a:pPr>
+              <a:t>11</a:t>
+            </a:fld>
+            <a:endParaRPr lang="en-AU"/>
+          </a:p>
+        </p:txBody>
+      </p:sp>
+    </p:spTree>
+    <p:extLst>
+      <p:ext uri="{BB962C8B-B14F-4D97-AF65-F5344CB8AC3E}">
+        <p14:creationId xmlns:p14="http://schemas.microsoft.com/office/powerpoint/2010/main" val="2855982016"/>
+      </p:ext>
+    </p:extLst>
+  </p:cSld>
+  <p:clrMapOvr>
+    <a:masterClrMapping/>
+  </p:clrMapOvr>
+</p:notes>
+</file>
+
+<file path=ppt/notesSlides/notesSlide9.xml><?xml version="1.0" encoding="utf-8"?>
+<p:notes xmlns:a="http://schemas.openxmlformats.org/drawingml/2006/main" xmlns:r="http://schemas.openxmlformats.org/officeDocument/2006/relationships" xmlns:p="http://schemas.openxmlformats.org/presentationml/2006/main">
+  <p:cSld>
+    <p:spTree>
+      <p:nvGrpSpPr>
+        <p:cNvPr id="1" name=""/>
+        <p:cNvGrpSpPr/>
+        <p:nvPr/>
+      </p:nvGrpSpPr>
+      <p:grpSpPr>
+        <a:xfrm>
+          <a:off x="0" y="0"/>
+          <a:ext cx="0" cy="0"/>
+          <a:chOff x="0" y="0"/>
+          <a:chExt cx="0" cy="0"/>
+        </a:xfrm>
+      </p:grpSpPr>
+      <p:sp>
+        <p:nvSpPr>
+          <p:cNvPr id="2" name="Slide Image Placeholder 1"/>
+          <p:cNvSpPr>
+            <a:spLocks noGrp="1" noRot="1" noChangeAspect="1"/>
+          </p:cNvSpPr>
+          <p:nvPr>
+            <p:ph type="sldImg"/>
+          </p:nvPr>
+        </p:nvSpPr>
+        <p:spPr/>
+      </p:sp>
+      <p:sp>
+        <p:nvSpPr>
+          <p:cNvPr id="3" name="Notes Placeholder 2"/>
+          <p:cNvSpPr>
+            <a:spLocks noGrp="1"/>
+          </p:cNvSpPr>
+          <p:nvPr>
+            <p:ph type="body" idx="1"/>
+          </p:nvPr>
+        </p:nvSpPr>
+        <p:spPr/>
+        <p:txBody>
+          <a:bodyPr/>
+          <a:lstStyle/>
+          <a:p>
+            <a:r>
+              <a:rPr lang="en-US" dirty="0"/>
+              <a:t>Else Move the vector to another closest partition and find nearest neighbor in that partition nearer than previously found. In spark we achieve by repartitioning using “</a:t>
+            </a:r>
+            <a:r>
+              <a:rPr lang="en-US" b="1" dirty="0" err="1"/>
+              <a:t>partitionBy</a:t>
+            </a:r>
+            <a:r>
+              <a:rPr lang="en-US" dirty="0"/>
+              <a:t>”. Any vector which needs to be moved automatically gets moved to right partition. </a:t>
+            </a:r>
+          </a:p>
+          <a:p>
+            <a:endParaRPr lang="en-US" dirty="0"/>
+          </a:p>
+        </p:txBody>
+      </p:sp>
+      <p:sp>
+        <p:nvSpPr>
+          <p:cNvPr id="4" name="Slide Number Placeholder 3"/>
+          <p:cNvSpPr>
+            <a:spLocks noGrp="1"/>
+          </p:cNvSpPr>
+          <p:nvPr>
+            <p:ph type="sldNum" sz="quarter" idx="10"/>
+          </p:nvPr>
+        </p:nvSpPr>
+        <p:spPr/>
+        <p:txBody>
+          <a:bodyPr/>
+          <a:lstStyle/>
+          <a:p>
+            <a:pPr>
+              <a:defRPr/>
+            </a:pPr>
+            <a:fld id="{7F095C4C-A269-498F-B608-25A42E521BF5}" type="slidenum">
+              <a:rPr lang="en-AU" smtClean="0"/>
+              <a:pPr>
+                <a:defRPr/>
+              </a:pPr>
+              <a:t>12</a:t>
+            </a:fld>
+            <a:endParaRPr lang="en-AU"/>
+          </a:p>
+        </p:txBody>
+      </p:sp>
+    </p:spTree>
+    <p:extLst>
+      <p:ext uri="{BB962C8B-B14F-4D97-AF65-F5344CB8AC3E}">
+        <p14:creationId xmlns:p14="http://schemas.microsoft.com/office/powerpoint/2010/main" val="787282869"/>
       </p:ext>
     </p:extLst>
   </p:cSld>
@@ -10043,111 +10843,9 @@
             <a:pPr algn="ctr"/>
             <a:r>
               <a:rPr lang="en-US" dirty="0" smtClean="0"/>
-              <a:t>Detailed Algorithm</a:t>
+              <a:t>Voronoi Partition</a:t>
             </a:r>
             <a:endParaRPr lang="en-US" dirty="0"/>
-          </a:p>
-        </p:txBody>
-      </p:sp>
-      <p:sp>
-        <p:nvSpPr>
-          <p:cNvPr id="3" name="Content Placeholder 2"/>
-          <p:cNvSpPr>
-            <a:spLocks noGrp="1"/>
-          </p:cNvSpPr>
-          <p:nvPr>
-            <p:ph sz="half" idx="1"/>
-          </p:nvPr>
-        </p:nvSpPr>
-        <p:spPr/>
-        <p:txBody>
-          <a:bodyPr/>
-          <a:lstStyle/>
-          <a:p>
-            <a:pPr marL="342900" indent="-342900">
-              <a:buFont typeface="+mj-lt"/>
-              <a:buAutoNum type="arabicPeriod"/>
-            </a:pPr>
-            <a:r>
-              <a:rPr lang="en-US" sz="1800" dirty="0" smtClean="0"/>
-              <a:t>Select some random number of vectors (pivots) in the Training Dataset.</a:t>
-            </a:r>
-          </a:p>
-          <a:p>
-            <a:pPr marL="342900" indent="-342900">
-              <a:buFont typeface="+mj-lt"/>
-              <a:buAutoNum type="arabicPeriod"/>
-            </a:pPr>
-            <a:r>
-              <a:rPr lang="en-US" sz="1800" dirty="0" smtClean="0"/>
-              <a:t>Each pivot is a separate partition. In spark, dividing the data in to partition helps us to run an operation in parallel on each partition. The operation is called “map”</a:t>
-            </a:r>
-          </a:p>
-          <a:p>
-            <a:pPr marL="342900" indent="-342900">
-              <a:buFont typeface="+mj-lt"/>
-              <a:buAutoNum type="arabicPeriod"/>
-            </a:pPr>
-            <a:r>
-              <a:rPr lang="en-US" sz="1800" dirty="0" smtClean="0"/>
-              <a:t>Assign vectors in both Training and Test Dataset to closest pivots. All vectors belonging to a pivot form a partition. The partition data is stored in spark as a tuple of the form (</a:t>
-            </a:r>
-            <a:r>
-              <a:rPr lang="en-US" sz="1800" dirty="0" err="1" smtClean="0"/>
-              <a:t>partition_id</a:t>
-            </a:r>
-            <a:r>
-              <a:rPr lang="en-US" sz="1800" dirty="0" smtClean="0"/>
-              <a:t>, List(vectors))</a:t>
-            </a:r>
-          </a:p>
-          <a:p>
-            <a:pPr marL="342900" indent="-342900">
-              <a:buFont typeface="+mj-lt"/>
-              <a:buAutoNum type="arabicPeriod"/>
-            </a:pPr>
-            <a:r>
-              <a:rPr lang="en-US" sz="1800" dirty="0" smtClean="0"/>
-              <a:t>Partition id x in R and S dataset will be </a:t>
-            </a:r>
-            <a:r>
-              <a:rPr lang="en-US" sz="1800" dirty="0" err="1" smtClean="0"/>
-              <a:t>colocated</a:t>
-            </a:r>
-            <a:r>
-              <a:rPr lang="en-US" sz="1800" dirty="0" smtClean="0"/>
-              <a:t>. This avoids lots of shuffle</a:t>
-            </a:r>
-          </a:p>
-          <a:p>
-            <a:endParaRPr lang="en-US" dirty="0"/>
-          </a:p>
-        </p:txBody>
-      </p:sp>
-      <p:sp>
-        <p:nvSpPr>
-          <p:cNvPr id="9" name="Content Placeholder 8"/>
-          <p:cNvSpPr>
-            <a:spLocks noGrp="1"/>
-          </p:cNvSpPr>
-          <p:nvPr>
-            <p:ph sz="half" idx="2"/>
-          </p:nvPr>
-        </p:nvSpPr>
-        <p:spPr/>
-        <p:txBody>
-          <a:bodyPr/>
-          <a:lstStyle/>
-          <a:p>
-            <a:r>
-              <a:rPr lang="en-US" sz="1800" dirty="0" err="1" smtClean="0"/>
-              <a:t>Voronoi</a:t>
-            </a:r>
-            <a:r>
-              <a:rPr lang="en-US" sz="1800" dirty="0" smtClean="0"/>
-              <a:t> Partition</a:t>
-            </a:r>
-            <a:endParaRPr lang="en-US" sz="1800" dirty="0"/>
           </a:p>
         </p:txBody>
       </p:sp>
@@ -10177,32 +10875,30 @@
       </p:sp>
       <p:pic>
         <p:nvPicPr>
-          <p:cNvPr id="5" name="Picture 4"/>
+          <p:cNvPr id="9" name="Content Placeholder 8"/>
           <p:cNvPicPr>
-            <a:picLocks noChangeAspect="1"/>
+            <a:picLocks noGrp="1" noChangeAspect="1"/>
           </p:cNvPicPr>
-          <p:nvPr/>
+          <p:nvPr>
+            <p:ph idx="1"/>
+          </p:nvPr>
         </p:nvPicPr>
-        <p:blipFill>
+        <p:blipFill rotWithShape="1">
           <a:blip r:embed="rId2"/>
-          <a:stretch>
-            <a:fillRect/>
-          </a:stretch>
+          <a:srcRect l="-283" t="-218" r="-141" b="-498"/>
+          <a:stretch/>
         </p:blipFill>
         <p:spPr>
           <a:xfrm>
-            <a:off x="5076056" y="1844824"/>
-            <a:ext cx="2540000" cy="2540000"/>
+            <a:off x="1663699" y="1320801"/>
+            <a:ext cx="5549901" cy="5132388"/>
           </a:xfrm>
-          <a:prstGeom prst="rect">
-            <a:avLst/>
-          </a:prstGeom>
         </p:spPr>
       </p:pic>
     </p:spTree>
     <p:extLst>
       <p:ext uri="{BB962C8B-B14F-4D97-AF65-F5344CB8AC3E}">
-        <p14:creationId xmlns:p14="http://schemas.microsoft.com/office/powerpoint/2010/main" val="2524500697"/>
+        <p14:creationId xmlns:p14="http://schemas.microsoft.com/office/powerpoint/2010/main" val="3188980010"/>
       </p:ext>
     </p:extLst>
   </p:cSld>
@@ -10241,7 +10937,7 @@
       </p:grpSpPr>
       <p:sp>
         <p:nvSpPr>
-          <p:cNvPr id="33" name="Title 32"/>
+          <p:cNvPr id="2" name="Title 1"/>
           <p:cNvSpPr>
             <a:spLocks noGrp="1"/>
           </p:cNvSpPr>
@@ -10256,12 +10952,8 @@
           <a:p>
             <a:pPr algn="ctr"/>
             <a:r>
-              <a:rPr lang="en-US" dirty="0"/>
-              <a:t>Detailed Algorithm </a:t>
-            </a:r>
-            <a:r>
               <a:rPr lang="en-US" dirty="0" smtClean="0"/>
-              <a:t>…</a:t>
+              <a:t>Detailed Algorithm</a:t>
             </a:r>
             <a:endParaRPr lang="en-US" dirty="0"/>
           </a:p>
@@ -10274,48 +10966,81 @@
             <a:spLocks noGrp="1"/>
           </p:cNvSpPr>
           <p:nvPr>
-            <p:ph sz="half" idx="2"/>
-          </p:nvPr>
-        </p:nvSpPr>
-        <p:spPr>
-          <a:xfrm>
-            <a:off x="107504" y="1268760"/>
-            <a:ext cx="4256088" cy="5095875"/>
-          </a:xfrm>
-        </p:spPr>
+            <p:ph idx="1"/>
+          </p:nvPr>
+        </p:nvSpPr>
+        <p:spPr/>
         <p:txBody>
           <a:bodyPr/>
           <a:lstStyle/>
           <a:p>
             <a:pPr marL="342900" indent="-342900">
               <a:buFont typeface="+mj-lt"/>
-              <a:buAutoNum type="arabicPeriod" startAt="4"/>
+              <a:buAutoNum type="arabicPeriod"/>
             </a:pPr>
             <a:r>
+              <a:rPr lang="en-US" sz="1800" dirty="0" smtClean="0"/>
+              <a:t>Select Random Pivots</a:t>
+            </a:r>
+            <a:endParaRPr lang="en-US" sz="1800" dirty="0" smtClean="0"/>
+          </a:p>
+          <a:p>
+            <a:pPr marL="342900" indent="-342900">
+              <a:buFont typeface="+mj-lt"/>
+              <a:buAutoNum type="arabicPeriod"/>
+            </a:pPr>
+            <a:r>
+              <a:rPr lang="en-US" sz="1800" dirty="0" smtClean="0"/>
+              <a:t>Assign </a:t>
+            </a:r>
+            <a:r>
+              <a:rPr lang="en-US" sz="1800" dirty="0" smtClean="0"/>
+              <a:t>vectors in both Training and Test Dataset to closest pivots. All vectors belonging to a pivot form a partition. </a:t>
+            </a:r>
+            <a:endParaRPr lang="en-US" sz="1800" dirty="0" smtClean="0"/>
+          </a:p>
+          <a:p>
+            <a:pPr marL="342900" indent="-342900">
+              <a:buFont typeface="+mj-lt"/>
+              <a:buAutoNum type="arabicPeriod"/>
+            </a:pPr>
+            <a:r>
+              <a:rPr lang="en-US" sz="1800" dirty="0" smtClean="0"/>
+              <a:t>The </a:t>
+            </a:r>
+            <a:r>
+              <a:rPr lang="en-US" sz="1800" dirty="0" smtClean="0"/>
+              <a:t>partition data is stored in spark as a tuple of the form (</a:t>
+            </a:r>
+            <a:r>
+              <a:rPr lang="en-US" sz="1800" dirty="0" err="1" smtClean="0"/>
+              <a:t>partition_id</a:t>
+            </a:r>
+            <a:r>
+              <a:rPr lang="en-US" sz="1800" dirty="0" smtClean="0"/>
+              <a:t>, List(vectors)</a:t>
+            </a:r>
+            <a:r>
+              <a:rPr lang="en-US" sz="1800" dirty="0" smtClean="0"/>
+              <a:t>)</a:t>
+            </a:r>
+          </a:p>
+          <a:p>
+            <a:pPr marL="342900" indent="-342900">
+              <a:buFont typeface="+mj-lt"/>
+              <a:buAutoNum type="arabicPeriod"/>
+            </a:pPr>
+            <a:r>
               <a:rPr lang="en-US" sz="1800" dirty="0"/>
-              <a:t>Self Join: For any partition in Test </a:t>
-            </a:r>
-            <a:r>
-              <a:rPr lang="en-US" sz="1800" dirty="0" smtClean="0"/>
-              <a:t>Dataset</a:t>
-            </a:r>
-            <a:r>
-              <a:rPr lang="en-US" sz="1800" dirty="0"/>
-              <a:t>, find k nearest neighbors in Training Dataset in the same partition. </a:t>
-            </a:r>
-            <a:r>
-              <a:rPr lang="en-US" sz="1800" dirty="0" smtClean="0"/>
-              <a:t>In spark we join two dataset using “</a:t>
-            </a:r>
-            <a:r>
-              <a:rPr lang="en-US" sz="1800" b="1" dirty="0" smtClean="0"/>
-              <a:t>join</a:t>
-            </a:r>
-            <a:r>
-              <a:rPr lang="en-US" sz="1800" dirty="0" smtClean="0"/>
-              <a:t>” operation, which gives us elements of same key in both dataset together. This helps us to run operation on taking partition from R and S together. </a:t>
-            </a:r>
-            <a:endParaRPr lang="en-US" sz="1800" dirty="0"/>
+              <a:t>Self Join: For any partition in Test Dataset, find k nearest neighbors in Training Dataset in the same partition. </a:t>
+            </a:r>
+          </a:p>
+          <a:p>
+            <a:pPr marL="342900" indent="-342900">
+              <a:buFont typeface="+mj-lt"/>
+              <a:buAutoNum type="arabicPeriod"/>
+            </a:pPr>
+            <a:endParaRPr lang="en-US" sz="1800" dirty="0" smtClean="0"/>
           </a:p>
           <a:p>
             <a:endParaRPr lang="en-US" dirty="0"/>
@@ -10324,7 +11049,7 @@
       </p:sp>
       <p:sp>
         <p:nvSpPr>
-          <p:cNvPr id="5" name="Slide Number Placeholder 4"/>
+          <p:cNvPr id="4" name="Slide Number Placeholder 3"/>
           <p:cNvSpPr>
             <a:spLocks noGrp="1"/>
           </p:cNvSpPr>
@@ -10337,7 +11062,7 @@
           <a:bodyPr/>
           <a:lstStyle/>
           <a:p>
-            <a:fld id="{3ED5713E-7A65-426C-8722-E41458A6066D}" type="slidenum">
+            <a:fld id="{E15C958E-F62C-4427-BED2-9F2AD66C62E6}" type="slidenum">
               <a:rPr lang="en-AU" smtClean="0"/>
               <a:pPr/>
               <a:t>11</a:t>
@@ -10346,1014 +11071,10 @@
           </a:p>
         </p:txBody>
       </p:sp>
-      <p:grpSp>
-        <p:nvGrpSpPr>
-          <p:cNvPr id="64" name="Group 63"/>
-          <p:cNvGrpSpPr/>
-          <p:nvPr/>
-        </p:nvGrpSpPr>
-        <p:grpSpPr>
-          <a:xfrm>
-            <a:off x="4283968" y="2492896"/>
-            <a:ext cx="1924214" cy="2247056"/>
-            <a:chOff x="683568" y="2420888"/>
-            <a:chExt cx="2664296" cy="2247056"/>
-          </a:xfrm>
-        </p:grpSpPr>
-        <p:cxnSp>
-          <p:nvCxnSpPr>
-            <p:cNvPr id="7" name="Straight Connector 6"/>
-            <p:cNvCxnSpPr/>
-            <p:nvPr/>
-          </p:nvCxnSpPr>
-          <p:spPr>
-            <a:xfrm>
-              <a:off x="1259632" y="2420888"/>
-              <a:ext cx="1944216" cy="1512168"/>
-            </a:xfrm>
-            <a:prstGeom prst="line">
-              <a:avLst/>
-            </a:prstGeom>
-          </p:spPr>
-          <p:style>
-            <a:lnRef idx="2">
-              <a:schemeClr val="accent1"/>
-            </a:lnRef>
-            <a:fillRef idx="0">
-              <a:schemeClr val="accent1"/>
-            </a:fillRef>
-            <a:effectRef idx="1">
-              <a:schemeClr val="accent1"/>
-            </a:effectRef>
-            <a:fontRef idx="minor">
-              <a:schemeClr val="tx1"/>
-            </a:fontRef>
-          </p:style>
-        </p:cxnSp>
-        <p:cxnSp>
-          <p:nvCxnSpPr>
-            <p:cNvPr id="8" name="Straight Connector 7"/>
-            <p:cNvCxnSpPr/>
-            <p:nvPr/>
-          </p:nvCxnSpPr>
-          <p:spPr>
-            <a:xfrm flipV="1">
-              <a:off x="683568" y="2636912"/>
-              <a:ext cx="2592288" cy="504056"/>
-            </a:xfrm>
-            <a:prstGeom prst="line">
-              <a:avLst/>
-            </a:prstGeom>
-          </p:spPr>
-          <p:style>
-            <a:lnRef idx="2">
-              <a:schemeClr val="accent1"/>
-            </a:lnRef>
-            <a:fillRef idx="0">
-              <a:schemeClr val="accent1"/>
-            </a:fillRef>
-            <a:effectRef idx="1">
-              <a:schemeClr val="accent1"/>
-            </a:effectRef>
-            <a:fontRef idx="minor">
-              <a:schemeClr val="tx1"/>
-            </a:fontRef>
-          </p:style>
-        </p:cxnSp>
-        <p:cxnSp>
-          <p:nvCxnSpPr>
-            <p:cNvPr id="13" name="Straight Connector 12"/>
-            <p:cNvCxnSpPr/>
-            <p:nvPr/>
-          </p:nvCxnSpPr>
-          <p:spPr>
-            <a:xfrm>
-              <a:off x="827584" y="2852936"/>
-              <a:ext cx="1800200" cy="1800200"/>
-            </a:xfrm>
-            <a:prstGeom prst="line">
-              <a:avLst/>
-            </a:prstGeom>
-          </p:spPr>
-          <p:style>
-            <a:lnRef idx="2">
-              <a:schemeClr val="accent1"/>
-            </a:lnRef>
-            <a:fillRef idx="0">
-              <a:schemeClr val="accent1"/>
-            </a:fillRef>
-            <a:effectRef idx="1">
-              <a:schemeClr val="accent1"/>
-            </a:effectRef>
-            <a:fontRef idx="minor">
-              <a:schemeClr val="tx1"/>
-            </a:fontRef>
-          </p:style>
-        </p:cxnSp>
-        <p:cxnSp>
-          <p:nvCxnSpPr>
-            <p:cNvPr id="15" name="Straight Connector 14"/>
-            <p:cNvCxnSpPr/>
-            <p:nvPr/>
-          </p:nvCxnSpPr>
-          <p:spPr>
-            <a:xfrm flipV="1">
-              <a:off x="1331640" y="3356992"/>
-              <a:ext cx="1872208" cy="1152128"/>
-            </a:xfrm>
-            <a:prstGeom prst="line">
-              <a:avLst/>
-            </a:prstGeom>
-          </p:spPr>
-          <p:style>
-            <a:lnRef idx="2">
-              <a:schemeClr val="accent1"/>
-            </a:lnRef>
-            <a:fillRef idx="0">
-              <a:schemeClr val="accent1"/>
-            </a:fillRef>
-            <a:effectRef idx="1">
-              <a:schemeClr val="accent1"/>
-            </a:effectRef>
-            <a:fontRef idx="minor">
-              <a:schemeClr val="tx1"/>
-            </a:fontRef>
-          </p:style>
-        </p:cxnSp>
-        <p:sp>
-          <p:nvSpPr>
-            <p:cNvPr id="16" name="TextBox 15"/>
-            <p:cNvSpPr txBox="1"/>
-            <p:nvPr/>
-          </p:nvSpPr>
-          <p:spPr>
-            <a:xfrm>
-              <a:off x="971600" y="2564904"/>
-              <a:ext cx="360040" cy="230832"/>
-            </a:xfrm>
-            <a:prstGeom prst="rect">
-              <a:avLst/>
-            </a:prstGeom>
-            <a:noFill/>
-          </p:spPr>
-          <p:txBody>
-            <a:bodyPr wrap="square" rtlCol="0">
-              <a:spAutoFit/>
-            </a:bodyPr>
-            <a:lstStyle/>
-            <a:p>
-              <a:r>
-                <a:rPr lang="en-US" sz="900" dirty="0" smtClean="0"/>
-                <a:t>P1</a:t>
-              </a:r>
-              <a:endParaRPr lang="en-US" sz="900" dirty="0"/>
-            </a:p>
-          </p:txBody>
-        </p:sp>
-        <p:sp>
-          <p:nvSpPr>
-            <p:cNvPr id="18" name="TextBox 17"/>
-            <p:cNvSpPr txBox="1"/>
-            <p:nvPr/>
-          </p:nvSpPr>
-          <p:spPr>
-            <a:xfrm>
-              <a:off x="1691680" y="2420888"/>
-              <a:ext cx="360040" cy="230832"/>
-            </a:xfrm>
-            <a:prstGeom prst="rect">
-              <a:avLst/>
-            </a:prstGeom>
-            <a:noFill/>
-          </p:spPr>
-          <p:txBody>
-            <a:bodyPr wrap="square" rtlCol="0">
-              <a:spAutoFit/>
-            </a:bodyPr>
-            <a:lstStyle/>
-            <a:p>
-              <a:r>
-                <a:rPr lang="en-US" sz="900" dirty="0" smtClean="0"/>
-                <a:t>P2</a:t>
-              </a:r>
-              <a:endParaRPr lang="en-US" sz="900" dirty="0"/>
-            </a:p>
-          </p:txBody>
-        </p:sp>
-        <p:sp>
-          <p:nvSpPr>
-            <p:cNvPr id="19" name="TextBox 18"/>
-            <p:cNvSpPr txBox="1"/>
-            <p:nvPr/>
-          </p:nvSpPr>
-          <p:spPr>
-            <a:xfrm>
-              <a:off x="2339752" y="2982144"/>
-              <a:ext cx="360040" cy="230832"/>
-            </a:xfrm>
-            <a:prstGeom prst="rect">
-              <a:avLst/>
-            </a:prstGeom>
-            <a:noFill/>
-          </p:spPr>
-          <p:txBody>
-            <a:bodyPr wrap="square" rtlCol="0">
-              <a:spAutoFit/>
-            </a:bodyPr>
-            <a:lstStyle/>
-            <a:p>
-              <a:r>
-                <a:rPr lang="en-US" sz="900" dirty="0" smtClean="0"/>
-                <a:t>P4</a:t>
-              </a:r>
-              <a:endParaRPr lang="en-US" sz="900" dirty="0"/>
-            </a:p>
-          </p:txBody>
-        </p:sp>
-        <p:sp>
-          <p:nvSpPr>
-            <p:cNvPr id="20" name="TextBox 19"/>
-            <p:cNvSpPr txBox="1"/>
-            <p:nvPr/>
-          </p:nvSpPr>
-          <p:spPr>
-            <a:xfrm>
-              <a:off x="2987824" y="3558208"/>
-              <a:ext cx="360040" cy="230832"/>
-            </a:xfrm>
-            <a:prstGeom prst="rect">
-              <a:avLst/>
-            </a:prstGeom>
-            <a:noFill/>
-          </p:spPr>
-          <p:txBody>
-            <a:bodyPr wrap="square" rtlCol="0">
-              <a:spAutoFit/>
-            </a:bodyPr>
-            <a:lstStyle/>
-            <a:p>
-              <a:r>
-                <a:rPr lang="en-US" sz="900" dirty="0" smtClean="0"/>
-                <a:t>P5</a:t>
-              </a:r>
-              <a:endParaRPr lang="en-US" sz="900" dirty="0"/>
-            </a:p>
-          </p:txBody>
-        </p:sp>
-        <p:sp>
-          <p:nvSpPr>
-            <p:cNvPr id="21" name="TextBox 20"/>
-            <p:cNvSpPr txBox="1"/>
-            <p:nvPr/>
-          </p:nvSpPr>
-          <p:spPr>
-            <a:xfrm>
-              <a:off x="2555776" y="4077072"/>
-              <a:ext cx="360040" cy="230832"/>
-            </a:xfrm>
-            <a:prstGeom prst="rect">
-              <a:avLst/>
-            </a:prstGeom>
-            <a:noFill/>
-          </p:spPr>
-          <p:txBody>
-            <a:bodyPr wrap="square" rtlCol="0">
-              <a:spAutoFit/>
-            </a:bodyPr>
-            <a:lstStyle/>
-            <a:p>
-              <a:r>
-                <a:rPr lang="en-US" sz="900" dirty="0" smtClean="0"/>
-                <a:t>P6</a:t>
-              </a:r>
-              <a:endParaRPr lang="en-US" sz="900" dirty="0"/>
-            </a:p>
-          </p:txBody>
-        </p:sp>
-        <p:sp>
-          <p:nvSpPr>
-            <p:cNvPr id="22" name="TextBox 21"/>
-            <p:cNvSpPr txBox="1"/>
-            <p:nvPr/>
-          </p:nvSpPr>
-          <p:spPr>
-            <a:xfrm>
-              <a:off x="1835696" y="4437112"/>
-              <a:ext cx="360040" cy="230832"/>
-            </a:xfrm>
-            <a:prstGeom prst="rect">
-              <a:avLst/>
-            </a:prstGeom>
-            <a:noFill/>
-          </p:spPr>
-          <p:txBody>
-            <a:bodyPr wrap="square" rtlCol="0">
-              <a:spAutoFit/>
-            </a:bodyPr>
-            <a:lstStyle/>
-            <a:p>
-              <a:r>
-                <a:rPr lang="en-US" sz="900" dirty="0" smtClean="0"/>
-                <a:t>P7</a:t>
-              </a:r>
-              <a:endParaRPr lang="en-US" sz="900" dirty="0"/>
-            </a:p>
-          </p:txBody>
-        </p:sp>
-        <p:sp>
-          <p:nvSpPr>
-            <p:cNvPr id="23" name="TextBox 22"/>
-            <p:cNvSpPr txBox="1"/>
-            <p:nvPr/>
-          </p:nvSpPr>
-          <p:spPr>
-            <a:xfrm>
-              <a:off x="1115616" y="3717032"/>
-              <a:ext cx="360040" cy="230832"/>
-            </a:xfrm>
-            <a:prstGeom prst="rect">
-              <a:avLst/>
-            </a:prstGeom>
-            <a:noFill/>
-          </p:spPr>
-          <p:txBody>
-            <a:bodyPr wrap="square" rtlCol="0">
-              <a:spAutoFit/>
-            </a:bodyPr>
-            <a:lstStyle/>
-            <a:p>
-              <a:r>
-                <a:rPr lang="en-US" sz="900" dirty="0" smtClean="0"/>
-                <a:t>P8</a:t>
-              </a:r>
-              <a:endParaRPr lang="en-US" sz="900" dirty="0"/>
-            </a:p>
-          </p:txBody>
-        </p:sp>
-        <p:sp>
-          <p:nvSpPr>
-            <p:cNvPr id="24" name="TextBox 23"/>
-            <p:cNvSpPr txBox="1"/>
-            <p:nvPr/>
-          </p:nvSpPr>
-          <p:spPr>
-            <a:xfrm>
-              <a:off x="1619672" y="3198168"/>
-              <a:ext cx="360040" cy="230832"/>
-            </a:xfrm>
-            <a:prstGeom prst="rect">
-              <a:avLst/>
-            </a:prstGeom>
-            <a:noFill/>
-          </p:spPr>
-          <p:txBody>
-            <a:bodyPr wrap="square" rtlCol="0">
-              <a:spAutoFit/>
-            </a:bodyPr>
-            <a:lstStyle/>
-            <a:p>
-              <a:r>
-                <a:rPr lang="en-US" sz="900" dirty="0" smtClean="0"/>
-                <a:t>P3</a:t>
-              </a:r>
-              <a:endParaRPr lang="en-US" sz="900" dirty="0"/>
-            </a:p>
-          </p:txBody>
-        </p:sp>
-      </p:grpSp>
-      <p:grpSp>
-        <p:nvGrpSpPr>
-          <p:cNvPr id="66" name="Group 65"/>
-          <p:cNvGrpSpPr/>
-          <p:nvPr/>
-        </p:nvGrpSpPr>
-        <p:grpSpPr>
-          <a:xfrm>
-            <a:off x="7236296" y="2348880"/>
-            <a:ext cx="1872208" cy="2232248"/>
-            <a:chOff x="4499992" y="2132856"/>
-            <a:chExt cx="2592288" cy="2232248"/>
-          </a:xfrm>
-        </p:grpSpPr>
-        <p:cxnSp>
-          <p:nvCxnSpPr>
-            <p:cNvPr id="46" name="Straight Connector 45"/>
-            <p:cNvCxnSpPr/>
-            <p:nvPr/>
-          </p:nvCxnSpPr>
-          <p:spPr>
-            <a:xfrm>
-              <a:off x="5004048" y="2132856"/>
-              <a:ext cx="1944216" cy="1512168"/>
-            </a:xfrm>
-            <a:prstGeom prst="line">
-              <a:avLst/>
-            </a:prstGeom>
-            <a:ln>
-              <a:solidFill>
-                <a:srgbClr val="DA4D5C"/>
-              </a:solidFill>
-            </a:ln>
-          </p:spPr>
-          <p:style>
-            <a:lnRef idx="2">
-              <a:schemeClr val="accent1"/>
-            </a:lnRef>
-            <a:fillRef idx="0">
-              <a:schemeClr val="accent1"/>
-            </a:fillRef>
-            <a:effectRef idx="1">
-              <a:schemeClr val="accent1"/>
-            </a:effectRef>
-            <a:fontRef idx="minor">
-              <a:schemeClr val="tx1"/>
-            </a:fontRef>
-          </p:style>
-        </p:cxnSp>
-        <p:cxnSp>
-          <p:nvCxnSpPr>
-            <p:cNvPr id="47" name="Straight Connector 46"/>
-            <p:cNvCxnSpPr/>
-            <p:nvPr/>
-          </p:nvCxnSpPr>
-          <p:spPr>
-            <a:xfrm flipV="1">
-              <a:off x="4499992" y="2276872"/>
-              <a:ext cx="1944216" cy="936104"/>
-            </a:xfrm>
-            <a:prstGeom prst="line">
-              <a:avLst/>
-            </a:prstGeom>
-            <a:ln>
-              <a:solidFill>
-                <a:srgbClr val="DA4D5C"/>
-              </a:solidFill>
-            </a:ln>
-          </p:spPr>
-          <p:style>
-            <a:lnRef idx="2">
-              <a:schemeClr val="accent1"/>
-            </a:lnRef>
-            <a:fillRef idx="0">
-              <a:schemeClr val="accent1"/>
-            </a:fillRef>
-            <a:effectRef idx="1">
-              <a:schemeClr val="accent1"/>
-            </a:effectRef>
-            <a:fontRef idx="minor">
-              <a:schemeClr val="tx1"/>
-            </a:fontRef>
-          </p:style>
-        </p:cxnSp>
-        <p:cxnSp>
-          <p:nvCxnSpPr>
-            <p:cNvPr id="48" name="Straight Connector 47"/>
-            <p:cNvCxnSpPr/>
-            <p:nvPr/>
-          </p:nvCxnSpPr>
-          <p:spPr>
-            <a:xfrm>
-              <a:off x="4572000" y="2564904"/>
-              <a:ext cx="1800200" cy="1800200"/>
-            </a:xfrm>
-            <a:prstGeom prst="line">
-              <a:avLst/>
-            </a:prstGeom>
-            <a:ln>
-              <a:solidFill>
-                <a:srgbClr val="DA4D5C"/>
-              </a:solidFill>
-            </a:ln>
-          </p:spPr>
-          <p:style>
-            <a:lnRef idx="2">
-              <a:schemeClr val="accent1"/>
-            </a:lnRef>
-            <a:fillRef idx="0">
-              <a:schemeClr val="accent1"/>
-            </a:fillRef>
-            <a:effectRef idx="1">
-              <a:schemeClr val="accent1"/>
-            </a:effectRef>
-            <a:fontRef idx="minor">
-              <a:schemeClr val="tx1"/>
-            </a:fontRef>
-          </p:style>
-        </p:cxnSp>
-        <p:cxnSp>
-          <p:nvCxnSpPr>
-            <p:cNvPr id="49" name="Straight Connector 48"/>
-            <p:cNvCxnSpPr>
-              <a:endCxn id="53" idx="0"/>
-            </p:cNvCxnSpPr>
-            <p:nvPr/>
-          </p:nvCxnSpPr>
-          <p:spPr>
-            <a:xfrm flipV="1">
-              <a:off x="5076056" y="3270176"/>
-              <a:ext cx="1836204" cy="662880"/>
-            </a:xfrm>
-            <a:prstGeom prst="line">
-              <a:avLst/>
-            </a:prstGeom>
-            <a:ln>
-              <a:solidFill>
-                <a:srgbClr val="DA4D5C"/>
-              </a:solidFill>
-            </a:ln>
-          </p:spPr>
-          <p:style>
-            <a:lnRef idx="2">
-              <a:schemeClr val="accent1"/>
-            </a:lnRef>
-            <a:fillRef idx="0">
-              <a:schemeClr val="accent1"/>
-            </a:fillRef>
-            <a:effectRef idx="1">
-              <a:schemeClr val="accent1"/>
-            </a:effectRef>
-            <a:fontRef idx="minor">
-              <a:schemeClr val="tx1"/>
-            </a:fontRef>
-          </p:style>
-        </p:cxnSp>
-        <p:sp>
-          <p:nvSpPr>
-            <p:cNvPr id="50" name="TextBox 49"/>
-            <p:cNvSpPr txBox="1"/>
-            <p:nvPr/>
-          </p:nvSpPr>
-          <p:spPr>
-            <a:xfrm>
-              <a:off x="4932040" y="2406080"/>
-              <a:ext cx="360040" cy="215444"/>
-            </a:xfrm>
-            <a:prstGeom prst="rect">
-              <a:avLst/>
-            </a:prstGeom>
-            <a:noFill/>
-          </p:spPr>
-          <p:txBody>
-            <a:bodyPr wrap="square" rtlCol="0">
-              <a:spAutoFit/>
-            </a:bodyPr>
-            <a:lstStyle/>
-            <a:p>
-              <a:r>
-                <a:rPr lang="en-US" sz="800" dirty="0" smtClean="0">
-                  <a:solidFill>
-                    <a:srgbClr val="FF0000"/>
-                  </a:solidFill>
-                </a:rPr>
-                <a:t>P1</a:t>
-              </a:r>
-              <a:endParaRPr lang="en-US" sz="800" dirty="0">
-                <a:solidFill>
-                  <a:srgbClr val="FF0000"/>
-                </a:solidFill>
-              </a:endParaRPr>
-            </a:p>
-          </p:txBody>
-        </p:sp>
-        <p:sp>
-          <p:nvSpPr>
-            <p:cNvPr id="51" name="TextBox 50"/>
-            <p:cNvSpPr txBox="1"/>
-            <p:nvPr/>
-          </p:nvSpPr>
-          <p:spPr>
-            <a:xfrm>
-              <a:off x="5436096" y="2132856"/>
-              <a:ext cx="360040" cy="215444"/>
-            </a:xfrm>
-            <a:prstGeom prst="rect">
-              <a:avLst/>
-            </a:prstGeom>
-            <a:noFill/>
-          </p:spPr>
-          <p:txBody>
-            <a:bodyPr wrap="square" rtlCol="0">
-              <a:spAutoFit/>
-            </a:bodyPr>
-            <a:lstStyle/>
-            <a:p>
-              <a:r>
-                <a:rPr lang="en-US" sz="800" dirty="0" smtClean="0">
-                  <a:solidFill>
-                    <a:srgbClr val="FF0000"/>
-                  </a:solidFill>
-                </a:rPr>
-                <a:t>P2</a:t>
-              </a:r>
-              <a:endParaRPr lang="en-US" sz="800" dirty="0">
-                <a:solidFill>
-                  <a:srgbClr val="FF0000"/>
-                </a:solidFill>
-              </a:endParaRPr>
-            </a:p>
-          </p:txBody>
-        </p:sp>
-        <p:sp>
-          <p:nvSpPr>
-            <p:cNvPr id="52" name="TextBox 51"/>
-            <p:cNvSpPr txBox="1"/>
-            <p:nvPr/>
-          </p:nvSpPr>
-          <p:spPr>
-            <a:xfrm>
-              <a:off x="6372200" y="2982144"/>
-              <a:ext cx="360040" cy="215444"/>
-            </a:xfrm>
-            <a:prstGeom prst="rect">
-              <a:avLst/>
-            </a:prstGeom>
-            <a:noFill/>
-          </p:spPr>
-          <p:txBody>
-            <a:bodyPr wrap="square" rtlCol="0">
-              <a:spAutoFit/>
-            </a:bodyPr>
-            <a:lstStyle/>
-            <a:p>
-              <a:r>
-                <a:rPr lang="en-US" sz="800" dirty="0" smtClean="0">
-                  <a:solidFill>
-                    <a:srgbClr val="FF0000"/>
-                  </a:solidFill>
-                </a:rPr>
-                <a:t>P4</a:t>
-              </a:r>
-              <a:endParaRPr lang="en-US" sz="800" dirty="0">
-                <a:solidFill>
-                  <a:srgbClr val="FF0000"/>
-                </a:solidFill>
-              </a:endParaRPr>
-            </a:p>
-          </p:txBody>
-        </p:sp>
-        <p:sp>
-          <p:nvSpPr>
-            <p:cNvPr id="53" name="TextBox 52"/>
-            <p:cNvSpPr txBox="1"/>
-            <p:nvPr/>
-          </p:nvSpPr>
-          <p:spPr>
-            <a:xfrm>
-              <a:off x="6732240" y="3270176"/>
-              <a:ext cx="360040" cy="215444"/>
-            </a:xfrm>
-            <a:prstGeom prst="rect">
-              <a:avLst/>
-            </a:prstGeom>
-            <a:noFill/>
-          </p:spPr>
-          <p:txBody>
-            <a:bodyPr wrap="square" rtlCol="0">
-              <a:spAutoFit/>
-            </a:bodyPr>
-            <a:lstStyle/>
-            <a:p>
-              <a:r>
-                <a:rPr lang="en-US" sz="800" dirty="0" smtClean="0">
-                  <a:solidFill>
-                    <a:srgbClr val="FF0000"/>
-                  </a:solidFill>
-                </a:rPr>
-                <a:t>P5</a:t>
-              </a:r>
-              <a:endParaRPr lang="en-US" sz="800" dirty="0">
-                <a:solidFill>
-                  <a:srgbClr val="FF0000"/>
-                </a:solidFill>
-              </a:endParaRPr>
-            </a:p>
-          </p:txBody>
-        </p:sp>
-        <p:sp>
-          <p:nvSpPr>
-            <p:cNvPr id="54" name="TextBox 53"/>
-            <p:cNvSpPr txBox="1"/>
-            <p:nvPr/>
-          </p:nvSpPr>
-          <p:spPr>
-            <a:xfrm>
-              <a:off x="6300192" y="3789040"/>
-              <a:ext cx="360040" cy="215444"/>
-            </a:xfrm>
-            <a:prstGeom prst="rect">
-              <a:avLst/>
-            </a:prstGeom>
-            <a:noFill/>
-          </p:spPr>
-          <p:txBody>
-            <a:bodyPr wrap="square" rtlCol="0">
-              <a:spAutoFit/>
-            </a:bodyPr>
-            <a:lstStyle/>
-            <a:p>
-              <a:r>
-                <a:rPr lang="en-US" sz="800" dirty="0" smtClean="0">
-                  <a:solidFill>
-                    <a:srgbClr val="FF0000"/>
-                  </a:solidFill>
-                </a:rPr>
-                <a:t>P6</a:t>
-              </a:r>
-              <a:endParaRPr lang="en-US" sz="800" dirty="0">
-                <a:solidFill>
-                  <a:srgbClr val="FF0000"/>
-                </a:solidFill>
-              </a:endParaRPr>
-            </a:p>
-          </p:txBody>
-        </p:sp>
-        <p:sp>
-          <p:nvSpPr>
-            <p:cNvPr id="55" name="TextBox 54"/>
-            <p:cNvSpPr txBox="1"/>
-            <p:nvPr/>
-          </p:nvSpPr>
-          <p:spPr>
-            <a:xfrm>
-              <a:off x="5580112" y="4149080"/>
-              <a:ext cx="360040" cy="215444"/>
-            </a:xfrm>
-            <a:prstGeom prst="rect">
-              <a:avLst/>
-            </a:prstGeom>
-            <a:noFill/>
-          </p:spPr>
-          <p:txBody>
-            <a:bodyPr wrap="square" rtlCol="0">
-              <a:spAutoFit/>
-            </a:bodyPr>
-            <a:lstStyle/>
-            <a:p>
-              <a:r>
-                <a:rPr lang="en-US" sz="800" dirty="0" smtClean="0">
-                  <a:solidFill>
-                    <a:srgbClr val="FF0000"/>
-                  </a:solidFill>
-                </a:rPr>
-                <a:t>P7</a:t>
-              </a:r>
-              <a:endParaRPr lang="en-US" sz="800" dirty="0">
-                <a:solidFill>
-                  <a:srgbClr val="FF0000"/>
-                </a:solidFill>
-              </a:endParaRPr>
-            </a:p>
-          </p:txBody>
-        </p:sp>
-        <p:sp>
-          <p:nvSpPr>
-            <p:cNvPr id="56" name="TextBox 55"/>
-            <p:cNvSpPr txBox="1"/>
-            <p:nvPr/>
-          </p:nvSpPr>
-          <p:spPr>
-            <a:xfrm>
-              <a:off x="4860032" y="3429000"/>
-              <a:ext cx="360040" cy="215444"/>
-            </a:xfrm>
-            <a:prstGeom prst="rect">
-              <a:avLst/>
-            </a:prstGeom>
-            <a:noFill/>
-          </p:spPr>
-          <p:txBody>
-            <a:bodyPr wrap="square" rtlCol="0">
-              <a:spAutoFit/>
-            </a:bodyPr>
-            <a:lstStyle/>
-            <a:p>
-              <a:r>
-                <a:rPr lang="en-US" sz="800" dirty="0" smtClean="0">
-                  <a:solidFill>
-                    <a:srgbClr val="FF0000"/>
-                  </a:solidFill>
-                </a:rPr>
-                <a:t>P8</a:t>
-              </a:r>
-              <a:endParaRPr lang="en-US" sz="800" dirty="0">
-                <a:solidFill>
-                  <a:srgbClr val="FF0000"/>
-                </a:solidFill>
-              </a:endParaRPr>
-            </a:p>
-          </p:txBody>
-        </p:sp>
-        <p:sp>
-          <p:nvSpPr>
-            <p:cNvPr id="57" name="TextBox 56"/>
-            <p:cNvSpPr txBox="1"/>
-            <p:nvPr/>
-          </p:nvSpPr>
-          <p:spPr>
-            <a:xfrm>
-              <a:off x="5364088" y="2910136"/>
-              <a:ext cx="360040" cy="215444"/>
-            </a:xfrm>
-            <a:prstGeom prst="rect">
-              <a:avLst/>
-            </a:prstGeom>
-            <a:noFill/>
-          </p:spPr>
-          <p:txBody>
-            <a:bodyPr wrap="square" rtlCol="0">
-              <a:spAutoFit/>
-            </a:bodyPr>
-            <a:lstStyle/>
-            <a:p>
-              <a:r>
-                <a:rPr lang="en-US" sz="800" dirty="0" smtClean="0">
-                  <a:solidFill>
-                    <a:srgbClr val="FF0000"/>
-                  </a:solidFill>
-                </a:rPr>
-                <a:t>P3</a:t>
-              </a:r>
-              <a:endParaRPr lang="en-US" sz="800" dirty="0">
-                <a:solidFill>
-                  <a:srgbClr val="FF0000"/>
-                </a:solidFill>
-              </a:endParaRPr>
-            </a:p>
-          </p:txBody>
-        </p:sp>
-        <p:sp>
-          <p:nvSpPr>
-            <p:cNvPr id="65" name="TextBox 64"/>
-            <p:cNvSpPr txBox="1"/>
-            <p:nvPr/>
-          </p:nvSpPr>
-          <p:spPr>
-            <a:xfrm>
-              <a:off x="5819264" y="2925386"/>
-              <a:ext cx="184666" cy="369332"/>
-            </a:xfrm>
-            <a:prstGeom prst="rect">
-              <a:avLst/>
-            </a:prstGeom>
-            <a:noFill/>
-          </p:spPr>
-          <p:txBody>
-            <a:bodyPr wrap="none" rtlCol="0">
-              <a:spAutoFit/>
-            </a:bodyPr>
-            <a:lstStyle/>
-            <a:p>
-              <a:endParaRPr lang="en-US" dirty="0"/>
-            </a:p>
-          </p:txBody>
-        </p:sp>
-      </p:grpSp>
-      <p:cxnSp>
-        <p:nvCxnSpPr>
-          <p:cNvPr id="68" name="Curved Connector 67"/>
-          <p:cNvCxnSpPr>
-            <a:stCxn id="16" idx="0"/>
-            <a:endCxn id="50" idx="0"/>
-          </p:cNvCxnSpPr>
-          <p:nvPr/>
-        </p:nvCxnSpPr>
-        <p:spPr>
-          <a:xfrm rot="5400000" flipH="1" flipV="1">
-            <a:off x="6142772" y="1101338"/>
-            <a:ext cx="14808" cy="3056340"/>
-          </a:xfrm>
-          <a:prstGeom prst="curvedConnector3">
-            <a:avLst>
-              <a:gd name="adj1" fmla="val 1643760"/>
-            </a:avLst>
-          </a:prstGeom>
-          <a:ln>
-            <a:headEnd type="arrow"/>
-            <a:tailEnd type="arrow"/>
-          </a:ln>
-        </p:spPr>
-        <p:style>
-          <a:lnRef idx="2">
-            <a:schemeClr val="accent1"/>
-          </a:lnRef>
-          <a:fillRef idx="0">
-            <a:schemeClr val="accent1"/>
-          </a:fillRef>
-          <a:effectRef idx="1">
-            <a:schemeClr val="accent1"/>
-          </a:effectRef>
-          <a:fontRef idx="minor">
-            <a:schemeClr val="tx1"/>
-          </a:fontRef>
-        </p:style>
-      </p:cxnSp>
-      <p:sp>
-        <p:nvSpPr>
-          <p:cNvPr id="70" name="TextBox 69"/>
-          <p:cNvSpPr txBox="1"/>
-          <p:nvPr/>
-        </p:nvSpPr>
-        <p:spPr>
-          <a:xfrm>
-            <a:off x="4499992" y="1484784"/>
-            <a:ext cx="1872208" cy="369332"/>
-          </a:xfrm>
-          <a:prstGeom prst="rect">
-            <a:avLst/>
-          </a:prstGeom>
-          <a:noFill/>
-        </p:spPr>
-        <p:txBody>
-          <a:bodyPr wrap="square" rtlCol="0">
-            <a:spAutoFit/>
-          </a:bodyPr>
-          <a:lstStyle/>
-          <a:p>
-            <a:r>
-              <a:rPr lang="en-US" dirty="0" smtClean="0"/>
-              <a:t>R Dataset</a:t>
-            </a:r>
-            <a:endParaRPr lang="en-US" dirty="0"/>
-          </a:p>
-        </p:txBody>
-      </p:sp>
-      <p:sp>
-        <p:nvSpPr>
-          <p:cNvPr id="71" name="TextBox 70"/>
-          <p:cNvSpPr txBox="1"/>
-          <p:nvPr/>
-        </p:nvSpPr>
-        <p:spPr>
-          <a:xfrm>
-            <a:off x="7308304" y="1268760"/>
-            <a:ext cx="1728192" cy="369332"/>
-          </a:xfrm>
-          <a:prstGeom prst="rect">
-            <a:avLst/>
-          </a:prstGeom>
-          <a:noFill/>
-        </p:spPr>
-        <p:txBody>
-          <a:bodyPr wrap="square" rtlCol="0">
-            <a:spAutoFit/>
-          </a:bodyPr>
-          <a:lstStyle/>
-          <a:p>
-            <a:r>
-              <a:rPr lang="en-US" dirty="0"/>
-              <a:t>S</a:t>
-            </a:r>
-            <a:r>
-              <a:rPr lang="en-US" dirty="0" smtClean="0"/>
-              <a:t> Dataset</a:t>
-            </a:r>
-            <a:endParaRPr lang="en-US" dirty="0"/>
-          </a:p>
-        </p:txBody>
-      </p:sp>
-      <p:cxnSp>
-        <p:nvCxnSpPr>
-          <p:cNvPr id="78" name="Curved Connector 77"/>
-          <p:cNvCxnSpPr>
-            <a:stCxn id="22" idx="2"/>
-            <a:endCxn id="55" idx="2"/>
-          </p:cNvCxnSpPr>
-          <p:nvPr/>
-        </p:nvCxnSpPr>
-        <p:spPr>
-          <a:xfrm rot="5400000" flipH="1" flipV="1">
-            <a:off x="6616535" y="3210089"/>
-            <a:ext cx="159404" cy="2900322"/>
-          </a:xfrm>
-          <a:prstGeom prst="curvedConnector3">
-            <a:avLst>
-              <a:gd name="adj1" fmla="val -143409"/>
-            </a:avLst>
-          </a:prstGeom>
-          <a:ln>
-            <a:headEnd type="arrow"/>
-            <a:tailEnd type="arrow"/>
-          </a:ln>
-        </p:spPr>
-        <p:style>
-          <a:lnRef idx="2">
-            <a:schemeClr val="accent1"/>
-          </a:lnRef>
-          <a:fillRef idx="0">
-            <a:schemeClr val="accent1"/>
-          </a:fillRef>
-          <a:effectRef idx="1">
-            <a:schemeClr val="accent1"/>
-          </a:effectRef>
-          <a:fontRef idx="minor">
-            <a:schemeClr val="tx1"/>
-          </a:fontRef>
-        </p:style>
-      </p:cxnSp>
     </p:spTree>
     <p:extLst>
       <p:ext uri="{BB962C8B-B14F-4D97-AF65-F5344CB8AC3E}">
-        <p14:creationId xmlns:p14="http://schemas.microsoft.com/office/powerpoint/2010/main" val="637653783"/>
+        <p14:creationId xmlns:p14="http://schemas.microsoft.com/office/powerpoint/2010/main" val="2524500697"/>
       </p:ext>
     </p:extLst>
   </p:cSld>
@@ -11457,15 +11178,15 @@
             </a:pPr>
             <a:r>
               <a:rPr lang="en-US" sz="1600" dirty="0" smtClean="0"/>
-              <a:t>Else Move the vector to another closest partition and find nearest neighbor in that partition nearer than previously found. In spark we achieve by repartitioning using “</a:t>
-            </a:r>
-            <a:r>
-              <a:rPr lang="en-US" sz="1600" b="1" dirty="0" err="1" smtClean="0"/>
-              <a:t>partitionBy</a:t>
+              <a:t>Else Move vector to another closest partition and </a:t>
             </a:r>
             <a:r>
               <a:rPr lang="en-US" sz="1600" dirty="0" smtClean="0"/>
-              <a:t>”. Any vector which needs to be moved automatically gets moved to right partition. </a:t>
+              <a:t>find </a:t>
+            </a:r>
+            <a:r>
+              <a:rPr lang="en-US" sz="1600" dirty="0" smtClean="0"/>
+              <a:t>and update neighbors</a:t>
             </a:r>
           </a:p>
           <a:p>
@@ -11475,7 +11196,11 @@
             </a:pPr>
             <a:r>
               <a:rPr lang="en-US" sz="1600" dirty="0" smtClean="0"/>
-              <a:t>Repeat until we find KNN for all the test vectors</a:t>
+              <a:t>Repeat </a:t>
+            </a:r>
+            <a:r>
+              <a:rPr lang="en-US" sz="1600" dirty="0" smtClean="0"/>
+              <a:t>until we find KNN for all the test vectors</a:t>
             </a:r>
             <a:endParaRPr lang="en-US" sz="1600" dirty="0"/>
           </a:p>
@@ -11545,7 +11270,7 @@
           </p:nvPr>
         </p:nvPicPr>
         <p:blipFill>
-          <a:blip r:embed="rId2"/>
+          <a:blip r:embed="rId3"/>
           <a:srcRect l="3318" r="3318"/>
           <a:stretch>
             <a:fillRect/>
@@ -11553,8 +11278,8 @@
         </p:blipFill>
         <p:spPr>
           <a:xfrm>
-            <a:off x="6156176" y="2132856"/>
-            <a:ext cx="2304256" cy="2304108"/>
+            <a:off x="4932040" y="2132856"/>
+            <a:ext cx="3528392" cy="3024336"/>
           </a:xfrm>
           <a:prstGeom prst="rect">
             <a:avLst/>
@@ -12030,13 +11755,8 @@
             </a:pPr>
             <a:r>
               <a:rPr lang="en-US" sz="1600" dirty="0" smtClean="0"/>
-              <a:t>The average computation per vector in our proposed algorithm is 10,000 where as in brute force it is 1000,000 for </a:t>
-            </a:r>
-            <a:r>
-              <a:rPr lang="en-US" sz="1600" smtClean="0"/>
-              <a:t>1Mx1M join</a:t>
-            </a:r>
-            <a:endParaRPr lang="en-US" sz="1600" dirty="0" smtClean="0"/>
+              <a:t>The average computation per vector in our proposed algorithm is 10,000 where as in brute force it is 1000,000 for 1Mx1M join</a:t>
+            </a:r>
           </a:p>
           <a:p>
             <a:pPr marL="342900" indent="-342900">
@@ -12964,9 +12684,73 @@
           </a:p>
         </p:txBody>
       </p:sp>
+      <p:sp>
+        <p:nvSpPr>
+          <p:cNvPr id="3" name="Content Placeholder 2"/>
+          <p:cNvSpPr>
+            <a:spLocks noGrp="1"/>
+          </p:cNvSpPr>
+          <p:nvPr>
+            <p:ph idx="1"/>
+          </p:nvPr>
+        </p:nvSpPr>
+        <p:spPr>
+          <a:xfrm>
+            <a:off x="4283968" y="1412776"/>
+            <a:ext cx="4630540" cy="5095875"/>
+          </a:xfrm>
+        </p:spPr>
+        <p:txBody>
+          <a:bodyPr/>
+          <a:lstStyle/>
+          <a:p>
+            <a:pPr marL="333375" indent="-342900">
+              <a:buFont typeface="+mj-lt"/>
+              <a:buAutoNum type="arabicPeriod"/>
+            </a:pPr>
+            <a:r>
+              <a:rPr lang="en-US" dirty="0" smtClean="0"/>
+              <a:t>The graph shows the effect of dimensions on run time. </a:t>
+            </a:r>
+          </a:p>
+          <a:p>
+            <a:pPr marL="333375" indent="-342900">
+              <a:buFont typeface="+mj-lt"/>
+              <a:buAutoNum type="arabicPeriod"/>
+            </a:pPr>
+            <a:r>
+              <a:rPr lang="en-US" dirty="0" smtClean="0"/>
+              <a:t>With </a:t>
+            </a:r>
+            <a:r>
+              <a:rPr lang="en-US" dirty="0"/>
+              <a:t>increasing dimensions, the performance drops a </a:t>
+            </a:r>
+            <a:r>
+              <a:rPr lang="en-US" dirty="0" smtClean="0"/>
+              <a:t>lot. As </a:t>
+            </a:r>
+            <a:r>
+              <a:rPr lang="en-US" dirty="0"/>
+              <a:t>dimension grows beyond 12, the performance drops significantly as more and more points lie on the edge. But still the performance of our algorithm is better than </a:t>
+            </a:r>
+            <a:r>
+              <a:rPr lang="en-US" dirty="0" smtClean="0"/>
+              <a:t>brute force </a:t>
+            </a:r>
+            <a:r>
+              <a:rPr lang="en-US" dirty="0"/>
+              <a:t>but not very highly though.</a:t>
+            </a:r>
+          </a:p>
+          <a:p>
+            <a:endParaRPr lang="en-US" dirty="0"/>
+          </a:p>
+        </p:txBody>
+      </p:sp>
       <p:pic>
         <p:nvPicPr>
-          <p:cNvPr id="18" name="Picture 17"/>
+          <p:cNvPr id="6" name="Picture 5"/>
           <p:cNvPicPr>
             <a:picLocks noChangeAspect="1"/>
           </p:cNvPicPr>
@@ -12980,78 +12764,14 @@
         </p:blipFill>
         <p:spPr>
           <a:xfrm>
-            <a:off x="467544" y="1988840"/>
-            <a:ext cx="3751932" cy="3095600"/>
+            <a:off x="539552" y="1916832"/>
+            <a:ext cx="3403600" cy="3096344"/>
           </a:xfrm>
           <a:prstGeom prst="rect">
             <a:avLst/>
           </a:prstGeom>
         </p:spPr>
       </p:pic>
-      <p:sp>
-        <p:nvSpPr>
-          <p:cNvPr id="3" name="Content Placeholder 2"/>
-          <p:cNvSpPr>
-            <a:spLocks noGrp="1"/>
-          </p:cNvSpPr>
-          <p:nvPr>
-            <p:ph idx="1"/>
-          </p:nvPr>
-        </p:nvSpPr>
-        <p:spPr>
-          <a:xfrm>
-            <a:off x="4283968" y="1412776"/>
-            <a:ext cx="4630540" cy="5095875"/>
-          </a:xfrm>
-        </p:spPr>
-        <p:txBody>
-          <a:bodyPr/>
-          <a:lstStyle/>
-          <a:p>
-            <a:pPr marL="333375" indent="-342900">
-              <a:buFont typeface="+mj-lt"/>
-              <a:buAutoNum type="arabicPeriod"/>
-            </a:pPr>
-            <a:r>
-              <a:rPr lang="en-US" dirty="0" smtClean="0"/>
-              <a:t>The graph shows the effect of dimensions on run time. </a:t>
-            </a:r>
-          </a:p>
-          <a:p>
-            <a:pPr marL="333375" indent="-342900">
-              <a:buFont typeface="+mj-lt"/>
-              <a:buAutoNum type="arabicPeriod"/>
-            </a:pPr>
-            <a:r>
-              <a:rPr lang="en-US" dirty="0" smtClean="0"/>
-              <a:t>With </a:t>
-            </a:r>
-            <a:r>
-              <a:rPr lang="en-US" dirty="0"/>
-              <a:t>increasing dimensions, the performance drops a </a:t>
-            </a:r>
-            <a:r>
-              <a:rPr lang="en-US" dirty="0" smtClean="0"/>
-              <a:t>lot. As </a:t>
-            </a:r>
-            <a:r>
-              <a:rPr lang="en-US" dirty="0"/>
-              <a:t>dimension grows beyond 12, the performance drops significantly as more and more points lie on the edge. But still the performance of our algorithm is better than </a:t>
-            </a:r>
-            <a:r>
-              <a:rPr lang="en-US" dirty="0" smtClean="0"/>
-              <a:t>brute force </a:t>
-            </a:r>
-            <a:r>
-              <a:rPr lang="en-US" dirty="0"/>
-              <a:t>but not very highly though.</a:t>
-            </a:r>
-          </a:p>
-          <a:p>
-            <a:endParaRPr lang="en-US" dirty="0"/>
-          </a:p>
-        </p:txBody>
-      </p:sp>
     </p:spTree>
     <p:extLst>
       <p:ext uri="{BB962C8B-B14F-4D97-AF65-F5344CB8AC3E}">
@@ -13100,7 +12820,11 @@
           <a:bodyPr/>
           <a:lstStyle/>
           <a:p>
-            <a:endParaRPr lang="en-AU"/>
+            <a:r>
+              <a:rPr lang="en-US" dirty="0" smtClean="0"/>
+              <a:t>Future Work</a:t>
+            </a:r>
+            <a:endParaRPr lang="en-US" dirty="0"/>
           </a:p>
         </p:txBody>
       </p:sp>
@@ -13119,17 +12843,13 @@
           <a:bodyPr/>
           <a:lstStyle/>
           <a:p>
-            <a:pPr algn="ctr"/>
-            <a:endParaRPr lang="en-AU" sz="6000" dirty="0" smtClean="0"/>
-          </a:p>
-          <a:p>
-            <a:pPr algn="ctr">
-              <a:buNone/>
-            </a:pPr>
-            <a:r>
-              <a:rPr lang="en-AU" sz="6000" dirty="0" smtClean="0"/>
-              <a:t>Thank you</a:t>
-            </a:r>
+            <a:r>
+              <a:rPr lang="en-US" dirty="0" smtClean="0"/>
+              <a:t>Improving performance of the algorithm for High dimensional dataset</a:t>
+            </a:r>
+          </a:p>
+          <a:p>
+            <a:endParaRPr lang="en-US" dirty="0"/>
           </a:p>
         </p:txBody>
       </p:sp>
@@ -13148,7 +12868,7 @@
           <a:bodyPr/>
           <a:lstStyle/>
           <a:p>
-            <a:fld id="{E15C958E-F62C-4427-BED2-9F2AD66C62E6}" type="slidenum">
+            <a:fld id="{1CAB187F-3B88-431B-B2AC-0056425A5D8B}" type="slidenum">
               <a:rPr lang="en-AU" smtClean="0"/>
               <a:pPr/>
               <a:t>19</a:t>
@@ -13158,6 +12878,11 @@
         </p:txBody>
       </p:sp>
     </p:spTree>
+    <p:extLst>
+      <p:ext uri="{BB962C8B-B14F-4D97-AF65-F5344CB8AC3E}">
+        <p14:creationId xmlns:p14="http://schemas.microsoft.com/office/powerpoint/2010/main" val="379498613"/>
+      </p:ext>
+    </p:extLst>
   </p:cSld>
   <p:clrMapOvr>
     <a:masterClrMapping/>
@@ -13165,13 +12890,6 @@
   <p:transition xmlns:p14="http://schemas.microsoft.com/office/powerpoint/2010/main">
     <p:pull dir="r"/>
   </p:transition>
-  <p:timing>
-    <p:tnLst>
-      <p:par>
-        <p:cTn xmlns:p14="http://schemas.microsoft.com/office/powerpoint/2010/main" id="1" dur="indefinite" restart="never" nodeType="tmRoot"/>
-      </p:par>
-    </p:tnLst>
-  </p:timing>
 </p:sld>
 </file>
 
@@ -13208,10 +12926,10 @@
           <a:lstStyle/>
           <a:p>
             <a:r>
-              <a:rPr lang="en-AU" dirty="0" smtClean="0"/>
+              <a:rPr lang="en-US" dirty="0" smtClean="0"/>
               <a:t>Agenda</a:t>
             </a:r>
-            <a:endParaRPr lang="en-AU" dirty="0"/>
+            <a:endParaRPr lang="en-US" dirty="0"/>
           </a:p>
         </p:txBody>
       </p:sp>
@@ -13225,58 +12943,63 @@
             <p:ph idx="1"/>
           </p:nvPr>
         </p:nvSpPr>
-        <p:spPr>
-          <a:xfrm>
-            <a:off x="250825" y="1429469"/>
-            <a:ext cx="8662988" cy="5095875"/>
-          </a:xfrm>
-        </p:spPr>
-        <p:txBody>
-          <a:bodyPr>
-            <a:normAutofit/>
-          </a:bodyPr>
+        <p:spPr/>
+        <p:txBody>
+          <a:bodyPr/>
           <a:lstStyle/>
           <a:p>
-            <a:endParaRPr lang="en-AU" dirty="0" smtClean="0"/>
-          </a:p>
-          <a:p>
-            <a:r>
-              <a:rPr lang="en-AU" dirty="0" smtClean="0"/>
-              <a:t>Introduction</a:t>
-            </a:r>
-          </a:p>
-          <a:p>
-            <a:r>
-              <a:rPr lang="en-AU" dirty="0" smtClean="0"/>
+            <a:r>
+              <a:rPr lang="en-US" dirty="0" smtClean="0"/>
+              <a:t>Overview</a:t>
+            </a:r>
+          </a:p>
+          <a:p>
+            <a:r>
+              <a:rPr lang="en-US" dirty="0" smtClean="0"/>
               <a:t>Previous Works</a:t>
             </a:r>
           </a:p>
           <a:p>
             <a:r>
-              <a:rPr lang="en-AU" dirty="0" smtClean="0"/>
-              <a:t>Problem Statement</a:t>
-            </a:r>
-          </a:p>
-          <a:p>
-            <a:r>
-              <a:rPr lang="en-AU" dirty="0" smtClean="0"/>
-              <a:t>Solution</a:t>
-            </a:r>
-          </a:p>
-          <a:p>
-            <a:r>
-              <a:rPr lang="en-AU" dirty="0" smtClean="0"/>
-              <a:t>Detailed Algorithm</a:t>
-            </a:r>
-          </a:p>
-          <a:p>
-            <a:r>
-              <a:rPr lang="en-AU" dirty="0" smtClean="0"/>
-              <a:t>Results and Analysis</a:t>
-            </a:r>
-          </a:p>
-          <a:p>
-            <a:endParaRPr lang="en-AU" dirty="0"/>
+              <a:rPr lang="en-US" dirty="0" smtClean="0"/>
+              <a:t>Contribution</a:t>
+            </a:r>
+          </a:p>
+          <a:p>
+            <a:r>
+              <a:rPr lang="en-US" dirty="0" smtClean="0"/>
+              <a:t>Proposed Solution</a:t>
+            </a:r>
+          </a:p>
+          <a:p>
+            <a:r>
+              <a:rPr lang="en-US" dirty="0" smtClean="0"/>
+              <a:t>Test Results</a:t>
+            </a:r>
+          </a:p>
+          <a:p>
+            <a:r>
+              <a:rPr lang="en-US" dirty="0" smtClean="0"/>
+              <a:t>Future Work</a:t>
+            </a:r>
+          </a:p>
+          <a:p>
+            <a:r>
+              <a:rPr lang="en-US" dirty="0" smtClean="0"/>
+              <a:t>References</a:t>
+            </a:r>
+          </a:p>
+          <a:p>
+            <a:endParaRPr lang="en-US" dirty="0" smtClean="0"/>
+          </a:p>
+          <a:p>
+            <a:endParaRPr lang="en-US" dirty="0" smtClean="0"/>
+          </a:p>
+          <a:p>
+            <a:endParaRPr lang="en-US" dirty="0" smtClean="0"/>
+          </a:p>
+          <a:p>
+            <a:endParaRPr lang="en-US" dirty="0"/>
           </a:p>
         </p:txBody>
       </p:sp>
@@ -13299,6 +13022,420 @@
               <a:rPr lang="en-AU" smtClean="0"/>
               <a:pPr/>
               <a:t>2</a:t>
+            </a:fld>
+            <a:endParaRPr lang="en-AU"/>
+          </a:p>
+        </p:txBody>
+      </p:sp>
+    </p:spTree>
+    <p:extLst>
+      <p:ext uri="{BB962C8B-B14F-4D97-AF65-F5344CB8AC3E}">
+        <p14:creationId xmlns:p14="http://schemas.microsoft.com/office/powerpoint/2010/main" val="2423626490"/>
+      </p:ext>
+    </p:extLst>
+  </p:cSld>
+  <p:clrMapOvr>
+    <a:masterClrMapping/>
+  </p:clrMapOvr>
+  <p:transition xmlns:p14="http://schemas.microsoft.com/office/powerpoint/2010/main">
+    <p:pull dir="r"/>
+  </p:transition>
+  <p:timing>
+    <p:tnLst>
+      <p:par>
+        <p:cTn xmlns:p14="http://schemas.microsoft.com/office/powerpoint/2010/main" id="1" dur="indefinite" restart="never" nodeType="tmRoot"/>
+      </p:par>
+    </p:tnLst>
+  </p:timing>
+</p:sld>
+</file>
+
+<file path=ppt/slides/slide20.xml><?xml version="1.0" encoding="utf-8"?>
+<p:sld xmlns:a="http://schemas.openxmlformats.org/drawingml/2006/main" xmlns:r="http://schemas.openxmlformats.org/officeDocument/2006/relationships" xmlns:p="http://schemas.openxmlformats.org/presentationml/2006/main">
+  <p:cSld>
+    <p:spTree>
+      <p:nvGrpSpPr>
+        <p:cNvPr id="1" name=""/>
+        <p:cNvGrpSpPr/>
+        <p:nvPr/>
+      </p:nvGrpSpPr>
+      <p:grpSpPr>
+        <a:xfrm>
+          <a:off x="0" y="0"/>
+          <a:ext cx="0" cy="0"/>
+          <a:chOff x="0" y="0"/>
+          <a:chExt cx="0" cy="0"/>
+        </a:xfrm>
+      </p:grpSpPr>
+      <p:sp>
+        <p:nvSpPr>
+          <p:cNvPr id="2" name="Title 1"/>
+          <p:cNvSpPr>
+            <a:spLocks noGrp="1"/>
+          </p:cNvSpPr>
+          <p:nvPr>
+            <p:ph type="title"/>
+          </p:nvPr>
+        </p:nvSpPr>
+        <p:spPr/>
+        <p:txBody>
+          <a:bodyPr/>
+          <a:lstStyle/>
+          <a:p>
+            <a:r>
+              <a:rPr lang="en-US" dirty="0" smtClean="0"/>
+              <a:t>References</a:t>
+            </a:r>
+            <a:endParaRPr lang="en-US" dirty="0"/>
+          </a:p>
+        </p:txBody>
+      </p:sp>
+      <p:sp>
+        <p:nvSpPr>
+          <p:cNvPr id="3" name="Content Placeholder 2"/>
+          <p:cNvSpPr>
+            <a:spLocks noGrp="1"/>
+          </p:cNvSpPr>
+          <p:nvPr>
+            <p:ph idx="1"/>
+          </p:nvPr>
+        </p:nvSpPr>
+        <p:spPr/>
+        <p:txBody>
+          <a:bodyPr/>
+          <a:lstStyle/>
+          <a:p>
+            <a:pPr marL="457200" indent="-457200">
+              <a:buFont typeface="+mj-lt"/>
+              <a:buAutoNum type="arabicPeriod"/>
+            </a:pPr>
+            <a:r>
+              <a:rPr lang="nl-NL" dirty="0" err="1"/>
+              <a:t>Efficient</a:t>
+            </a:r>
+            <a:r>
+              <a:rPr lang="nl-NL" dirty="0"/>
+              <a:t> parallel </a:t>
+            </a:r>
+            <a:r>
+              <a:rPr lang="nl-NL" dirty="0" err="1"/>
+              <a:t>kNN</a:t>
+            </a:r>
+            <a:r>
+              <a:rPr lang="nl-NL" dirty="0"/>
+              <a:t> </a:t>
+            </a:r>
+            <a:r>
+              <a:rPr lang="nl-NL" dirty="0" err="1"/>
+              <a:t>joins</a:t>
+            </a:r>
+            <a:r>
+              <a:rPr lang="nl-NL" dirty="0"/>
+              <a:t> </a:t>
+            </a:r>
+            <a:r>
+              <a:rPr lang="nl-NL" dirty="0" err="1"/>
+              <a:t>for</a:t>
+            </a:r>
+            <a:r>
+              <a:rPr lang="nl-NL" dirty="0"/>
+              <a:t> large data in </a:t>
+            </a:r>
+            <a:r>
+              <a:rPr lang="nl-NL" dirty="0" err="1"/>
+              <a:t>MapReduce</a:t>
+            </a:r>
+            <a:r>
+              <a:rPr lang="nl-NL" dirty="0"/>
+              <a:t> </a:t>
+            </a:r>
+            <a:r>
+              <a:rPr lang="nl-NL" dirty="0">
+                <a:hlinkClick r:id="rId2"/>
+              </a:rPr>
+              <a:t>http://dl.acm.org/citation.cfm?id=</a:t>
+            </a:r>
+            <a:r>
+              <a:rPr lang="nl-NL" dirty="0" smtClean="0">
+                <a:hlinkClick r:id="rId2"/>
+              </a:rPr>
+              <a:t>2247602</a:t>
+            </a:r>
+            <a:endParaRPr lang="nl-NL" dirty="0" smtClean="0"/>
+          </a:p>
+          <a:p>
+            <a:pPr marL="457200" indent="-457200">
+              <a:buFont typeface="+mj-lt"/>
+              <a:buAutoNum type="arabicPeriod"/>
+            </a:pPr>
+            <a:r>
+              <a:rPr lang="nl-NL" dirty="0" smtClean="0"/>
+              <a:t>Index-</a:t>
+            </a:r>
+            <a:r>
+              <a:rPr lang="nl-NL" dirty="0" err="1" smtClean="0"/>
+              <a:t>driven</a:t>
+            </a:r>
+            <a:r>
+              <a:rPr lang="nl-NL" dirty="0" smtClean="0"/>
+              <a:t> </a:t>
+            </a:r>
+            <a:r>
+              <a:rPr lang="nl-NL" dirty="0" err="1" smtClean="0"/>
+              <a:t>similarity</a:t>
+            </a:r>
+            <a:r>
+              <a:rPr lang="nl-NL" dirty="0" smtClean="0"/>
+              <a:t> search in </a:t>
+            </a:r>
+            <a:r>
+              <a:rPr lang="nl-NL" dirty="0" err="1" smtClean="0"/>
+              <a:t>metric</a:t>
+            </a:r>
+            <a:r>
+              <a:rPr lang="nl-NL" dirty="0" smtClean="0"/>
+              <a:t> </a:t>
+            </a:r>
+            <a:r>
+              <a:rPr lang="nl-NL" dirty="0" err="1" smtClean="0"/>
+              <a:t>spaces</a:t>
+            </a:r>
+            <a:r>
+              <a:rPr lang="nl-NL" dirty="0" smtClean="0"/>
+              <a:t> </a:t>
+            </a:r>
+            <a:r>
+              <a:rPr lang="nl-NL" dirty="0" smtClean="0">
+                <a:hlinkClick r:id="rId3"/>
+              </a:rPr>
+              <a:t>http</a:t>
+            </a:r>
+            <a:r>
+              <a:rPr lang="nl-NL" dirty="0">
+                <a:hlinkClick r:id="rId3"/>
+              </a:rPr>
+              <a:t>://dl.acm.org/citation.cfm?id=</a:t>
+            </a:r>
+            <a:r>
+              <a:rPr lang="nl-NL" dirty="0" smtClean="0">
+                <a:hlinkClick r:id="rId3"/>
+              </a:rPr>
+              <a:t>958948</a:t>
+            </a:r>
+            <a:endParaRPr lang="nl-NL" dirty="0"/>
+          </a:p>
+          <a:p>
+            <a:pPr marL="457200" indent="-457200">
+              <a:buFont typeface="+mj-lt"/>
+              <a:buAutoNum type="arabicPeriod"/>
+            </a:pPr>
+            <a:r>
+              <a:rPr lang="en-US" dirty="0"/>
+              <a:t>When is “nearest neighbor” meaningful? </a:t>
+            </a:r>
+            <a:r>
+              <a:rPr lang="nl-NL" dirty="0">
+                <a:hlinkClick r:id="rId4"/>
+              </a:rPr>
+              <a:t>http://link.springer.com/chapter/10.1007/3-540-49257-</a:t>
+            </a:r>
+            <a:r>
+              <a:rPr lang="nl-NL" dirty="0" smtClean="0">
+                <a:hlinkClick r:id="rId4"/>
+              </a:rPr>
+              <a:t>7_15</a:t>
+            </a:r>
+            <a:endParaRPr lang="en-US" dirty="0" smtClean="0">
+              <a:hlinkClick r:id="rId5"/>
+            </a:endParaRPr>
+          </a:p>
+          <a:p>
+            <a:pPr marL="457200" indent="-457200">
+              <a:buFont typeface="+mj-lt"/>
+              <a:buAutoNum type="arabicPeriod"/>
+            </a:pPr>
+            <a:r>
+              <a:rPr lang="en-US" dirty="0" smtClean="0">
+                <a:hlinkClick r:id="rId5"/>
+              </a:rPr>
+              <a:t>http</a:t>
+            </a:r>
+            <a:r>
+              <a:rPr lang="en-US" dirty="0">
+                <a:hlinkClick r:id="rId5"/>
+              </a:rPr>
+              <a:t>://hadoop.apache.org</a:t>
+            </a:r>
+            <a:r>
+              <a:rPr lang="en-US" dirty="0" smtClean="0">
+                <a:hlinkClick r:id="rId5"/>
+              </a:rPr>
+              <a:t>/</a:t>
+            </a:r>
+            <a:endParaRPr lang="en-US" dirty="0" smtClean="0"/>
+          </a:p>
+          <a:p>
+            <a:pPr marL="457200" indent="-457200">
+              <a:buFont typeface="+mj-lt"/>
+              <a:buAutoNum type="arabicPeriod"/>
+            </a:pPr>
+            <a:r>
+              <a:rPr lang="en-US" dirty="0">
+                <a:hlinkClick r:id="rId6"/>
+              </a:rPr>
+              <a:t>http://spark.apache.org</a:t>
+            </a:r>
+            <a:r>
+              <a:rPr lang="en-US" dirty="0" smtClean="0">
+                <a:hlinkClick r:id="rId6"/>
+              </a:rPr>
+              <a:t>/</a:t>
+            </a:r>
+            <a:endParaRPr lang="en-US" dirty="0" smtClean="0"/>
+          </a:p>
+          <a:p>
+            <a:pPr marL="457200" indent="-457200">
+              <a:buFont typeface="+mj-lt"/>
+              <a:buAutoNum type="arabicPeriod"/>
+            </a:pPr>
+            <a:endParaRPr lang="nl-NL" dirty="0"/>
+          </a:p>
+          <a:p>
+            <a:pPr marL="457200" indent="-457200">
+              <a:buFont typeface="+mj-lt"/>
+              <a:buAutoNum type="arabicPeriod"/>
+            </a:pPr>
+            <a:endParaRPr lang="en-US" dirty="0" smtClean="0"/>
+          </a:p>
+          <a:p>
+            <a:endParaRPr lang="en-US" dirty="0"/>
+          </a:p>
+        </p:txBody>
+      </p:sp>
+      <p:sp>
+        <p:nvSpPr>
+          <p:cNvPr id="4" name="Slide Number Placeholder 3"/>
+          <p:cNvSpPr>
+            <a:spLocks noGrp="1"/>
+          </p:cNvSpPr>
+          <p:nvPr>
+            <p:ph type="sldNum" sz="quarter" idx="10"/>
+          </p:nvPr>
+        </p:nvSpPr>
+        <p:spPr/>
+        <p:txBody>
+          <a:bodyPr/>
+          <a:lstStyle/>
+          <a:p>
+            <a:fld id="{1CAB187F-3B88-431B-B2AC-0056425A5D8B}" type="slidenum">
+              <a:rPr lang="en-AU" smtClean="0"/>
+              <a:pPr/>
+              <a:t>20</a:t>
+            </a:fld>
+            <a:endParaRPr lang="en-AU"/>
+          </a:p>
+        </p:txBody>
+      </p:sp>
+    </p:spTree>
+    <p:extLst>
+      <p:ext uri="{BB962C8B-B14F-4D97-AF65-F5344CB8AC3E}">
+        <p14:creationId xmlns:p14="http://schemas.microsoft.com/office/powerpoint/2010/main" val="4287079148"/>
+      </p:ext>
+    </p:extLst>
+  </p:cSld>
+  <p:clrMapOvr>
+    <a:masterClrMapping/>
+  </p:clrMapOvr>
+  <p:transition xmlns:p14="http://schemas.microsoft.com/office/powerpoint/2010/main">
+    <p:pull dir="r"/>
+  </p:transition>
+</p:sld>
+</file>
+
+<file path=ppt/slides/slide21.xml><?xml version="1.0" encoding="utf-8"?>
+<p:sld xmlns:a="http://schemas.openxmlformats.org/drawingml/2006/main" xmlns:r="http://schemas.openxmlformats.org/officeDocument/2006/relationships" xmlns:p="http://schemas.openxmlformats.org/presentationml/2006/main">
+  <p:cSld>
+    <p:spTree>
+      <p:nvGrpSpPr>
+        <p:cNvPr id="1" name=""/>
+        <p:cNvGrpSpPr/>
+        <p:nvPr/>
+      </p:nvGrpSpPr>
+      <p:grpSpPr>
+        <a:xfrm>
+          <a:off x="0" y="0"/>
+          <a:ext cx="0" cy="0"/>
+          <a:chOff x="0" y="0"/>
+          <a:chExt cx="0" cy="0"/>
+        </a:xfrm>
+      </p:grpSpPr>
+      <p:sp>
+        <p:nvSpPr>
+          <p:cNvPr id="2" name="Title 1"/>
+          <p:cNvSpPr>
+            <a:spLocks noGrp="1"/>
+          </p:cNvSpPr>
+          <p:nvPr>
+            <p:ph type="title"/>
+          </p:nvPr>
+        </p:nvSpPr>
+        <p:spPr/>
+        <p:txBody>
+          <a:bodyPr/>
+          <a:lstStyle/>
+          <a:p>
+            <a:endParaRPr lang="en-AU"/>
+          </a:p>
+        </p:txBody>
+      </p:sp>
+      <p:sp>
+        <p:nvSpPr>
+          <p:cNvPr id="3" name="Content Placeholder 2"/>
+          <p:cNvSpPr>
+            <a:spLocks noGrp="1"/>
+          </p:cNvSpPr>
+          <p:nvPr>
+            <p:ph idx="1"/>
+          </p:nvPr>
+        </p:nvSpPr>
+        <p:spPr/>
+        <p:txBody>
+          <a:bodyPr/>
+          <a:lstStyle/>
+          <a:p>
+            <a:pPr algn="ctr"/>
+            <a:endParaRPr lang="en-AU" sz="6000" dirty="0" smtClean="0"/>
+          </a:p>
+          <a:p>
+            <a:pPr algn="ctr">
+              <a:buNone/>
+            </a:pPr>
+            <a:r>
+              <a:rPr lang="en-AU" sz="6000" dirty="0" smtClean="0"/>
+              <a:t>Thank you</a:t>
+            </a:r>
+          </a:p>
+        </p:txBody>
+      </p:sp>
+      <p:sp>
+        <p:nvSpPr>
+          <p:cNvPr id="4" name="Slide Number Placeholder 3"/>
+          <p:cNvSpPr>
+            <a:spLocks noGrp="1"/>
+          </p:cNvSpPr>
+          <p:nvPr>
+            <p:ph type="sldNum" sz="quarter" idx="10"/>
+          </p:nvPr>
+        </p:nvSpPr>
+        <p:spPr/>
+        <p:txBody>
+          <a:bodyPr/>
+          <a:lstStyle/>
+          <a:p>
+            <a:fld id="{E15C958E-F62C-4427-BED2-9F2AD66C62E6}" type="slidenum">
+              <a:rPr lang="en-AU" smtClean="0"/>
+              <a:pPr/>
+              <a:t>21</a:t>
             </a:fld>
             <a:endParaRPr lang="en-AU"/>
           </a:p>
@@ -13391,35 +13528,125 @@
           <a:p>
             <a:r>
               <a:rPr lang="en-AU" dirty="0" smtClean="0"/>
-              <a:t>In KNN Classification, a vector v is classified by finding K nearest vectors in Training data [v1, v2 … </a:t>
+              <a:t>In KNN </a:t>
+            </a:r>
+            <a:r>
+              <a:rPr lang="en-AU" dirty="0" smtClean="0"/>
+              <a:t>Join, for every vector in </a:t>
+            </a:r>
+            <a:r>
+              <a:rPr lang="en-AU" dirty="0"/>
+              <a:t>test vectors [V</a:t>
+            </a:r>
+            <a:r>
+              <a:rPr lang="en-AU" baseline="-25000" dirty="0"/>
+              <a:t>t1</a:t>
+            </a:r>
+            <a:r>
+              <a:rPr lang="en-AU" dirty="0"/>
+              <a:t>, V</a:t>
+            </a:r>
+            <a:r>
+              <a:rPr lang="en-AU" baseline="-25000" dirty="0"/>
+              <a:t>t2</a:t>
+            </a:r>
+            <a:r>
+              <a:rPr lang="en-AU" dirty="0"/>
+              <a:t> … </a:t>
+            </a:r>
+            <a:r>
+              <a:rPr lang="en-AU" dirty="0" err="1"/>
+              <a:t>V</a:t>
+            </a:r>
+            <a:r>
+              <a:rPr lang="en-AU" baseline="-25000" dirty="0" err="1"/>
+              <a:t>tn</a:t>
+            </a:r>
+            <a:r>
+              <a:rPr lang="en-AU" dirty="0" smtClean="0"/>
+              <a:t>], we find</a:t>
+            </a:r>
+            <a:r>
+              <a:rPr lang="en-AU" dirty="0" smtClean="0"/>
+              <a:t> </a:t>
+            </a:r>
+            <a:r>
+              <a:rPr lang="en-AU" dirty="0" smtClean="0"/>
+              <a:t>K nearest vectors in Training data [</a:t>
+            </a:r>
+            <a:r>
+              <a:rPr lang="en-AU" dirty="0" smtClean="0"/>
+              <a:t>v</a:t>
+            </a:r>
+            <a:r>
+              <a:rPr lang="en-AU" baseline="-25000" dirty="0" smtClean="0"/>
+              <a:t>1</a:t>
+            </a:r>
+            <a:r>
+              <a:rPr lang="en-AU" dirty="0" smtClean="0"/>
+              <a:t>, v</a:t>
+            </a:r>
+            <a:r>
+              <a:rPr lang="en-AU" baseline="-25000" dirty="0" smtClean="0"/>
+              <a:t>2</a:t>
+            </a:r>
+            <a:r>
+              <a:rPr lang="en-AU" dirty="0" smtClean="0"/>
+              <a:t> </a:t>
+            </a:r>
+            <a:r>
+              <a:rPr lang="en-AU" dirty="0" smtClean="0"/>
+              <a:t>… </a:t>
             </a:r>
             <a:r>
               <a:rPr lang="en-AU" dirty="0" err="1" smtClean="0"/>
-              <a:t>vk</a:t>
+              <a:t>v</a:t>
+            </a:r>
+            <a:r>
+              <a:rPr lang="en-AU" baseline="-25000" dirty="0" err="1" smtClean="0"/>
+              <a:t>k</a:t>
             </a:r>
             <a:r>
               <a:rPr lang="en-AU" dirty="0" smtClean="0"/>
-              <a:t>] and classify v based on those training vectors’ class.</a:t>
-            </a:r>
-          </a:p>
-          <a:p>
+              <a:t>] </a:t>
+            </a:r>
             <a:r>
               <a:rPr lang="en-AU" dirty="0" smtClean="0"/>
-              <a:t>KNN Join, we have a set of test vectors [Vt1, vt2 … </a:t>
+              <a:t>and classify </a:t>
             </a:r>
             <a:r>
               <a:rPr lang="en-AU" dirty="0" err="1" smtClean="0"/>
-              <a:t>vtn</a:t>
+              <a:t>V</a:t>
+            </a:r>
+            <a:r>
+              <a:rPr lang="en-AU" baseline="-25000" dirty="0" err="1" smtClean="0"/>
+              <a:t>tx</a:t>
             </a:r>
             <a:r>
               <a:rPr lang="en-AU" dirty="0" smtClean="0"/>
-              <a:t>]. For every test vector we find the KNN. </a:t>
-            </a:r>
-          </a:p>
-          <a:p>
+              <a:t> </a:t>
+            </a:r>
             <a:r>
               <a:rPr lang="en-AU" dirty="0" smtClean="0"/>
-              <a:t>Applications: </a:t>
+              <a:t>based on </a:t>
+            </a:r>
+            <a:r>
+              <a:rPr lang="en-AU" dirty="0" smtClean="0"/>
+              <a:t>neighbour vectors</a:t>
+            </a:r>
+            <a:r>
+              <a:rPr lang="en-AU" dirty="0" smtClean="0"/>
+              <a:t>’ class.</a:t>
+            </a:r>
+          </a:p>
+          <a:p>
+            <a:r>
+              <a:rPr lang="en-AU" dirty="0" smtClean="0"/>
+              <a:t>Applications</a:t>
+            </a:r>
+            <a:r>
+              <a:rPr lang="en-AU" dirty="0" smtClean="0"/>
+              <a:t>: </a:t>
             </a:r>
           </a:p>
           <a:p>
@@ -13446,8 +13673,20 @@
             <a:pPr lvl="1"/>
             <a:r>
               <a:rPr lang="en-AU" dirty="0" smtClean="0"/>
-              <a:t>High Computational Complexity  =&gt; Not usable for big datasets</a:t>
-            </a:r>
+              <a:t>High Computational Complexity  =&gt; Not usable for big </a:t>
+            </a:r>
+            <a:r>
+              <a:rPr lang="en-AU" dirty="0" smtClean="0"/>
+              <a:t>datasets</a:t>
+            </a:r>
+          </a:p>
+          <a:p>
+            <a:pPr lvl="1"/>
+            <a:endParaRPr lang="en-AU" dirty="0" smtClean="0"/>
+          </a:p>
+          <a:p>
+            <a:pPr lvl="1"/>
+            <a:endParaRPr lang="en-AU" dirty="0" smtClean="0"/>
           </a:p>
           <a:p>
             <a:pPr marL="0" indent="0">
@@ -13539,7 +13778,7 @@
             <a:pPr algn="ctr"/>
             <a:r>
               <a:rPr lang="en-US" dirty="0" smtClean="0"/>
-              <a:t>Solution for Big datasets </a:t>
+              <a:t>Solution for Large datasets </a:t>
             </a:r>
             <a:endParaRPr lang="en-US" dirty="0"/>
           </a:p>
@@ -13566,7 +13805,11 @@
             </a:pPr>
             <a:r>
               <a:rPr lang="en-US" dirty="0" smtClean="0"/>
-              <a:t>Better Algorithm with lower computational complexity</a:t>
+              <a:t>Better Algorithm with lower computational </a:t>
+            </a:r>
+            <a:r>
+              <a:rPr lang="en-US" dirty="0" smtClean="0"/>
+              <a:t>complexity </a:t>
             </a:r>
           </a:p>
           <a:p>
@@ -13576,16 +13819,7 @@
             </a:pPr>
             <a:r>
               <a:rPr lang="en-US" dirty="0" smtClean="0"/>
-              <a:t>Leverage Distributed Clusters</a:t>
-            </a:r>
-          </a:p>
-          <a:p>
-            <a:pPr marL="0" indent="0">
-              <a:buNone/>
-            </a:pPr>
-            <a:r>
-              <a:rPr lang="en-US" dirty="0" smtClean="0"/>
-              <a:t> </a:t>
+              <a:t>Design a distributed algorithm for leveraging Distributed frameworks </a:t>
             </a:r>
             <a:endParaRPr lang="en-US" dirty="0"/>
           </a:p>
@@ -13628,6 +13862,13 @@
   <p:transition xmlns:p14="http://schemas.microsoft.com/office/powerpoint/2010/main">
     <p:pull dir="r"/>
   </p:transition>
+  <p:timing>
+    <p:tnLst>
+      <p:par>
+        <p:cTn xmlns:p14="http://schemas.microsoft.com/office/powerpoint/2010/main" id="1" dur="indefinite" restart="never" nodeType="tmRoot"/>
+      </p:par>
+    </p:tnLst>
+  </p:timing>
 </p:sld>
 </file>
 
@@ -13697,20 +13938,8 @@
               <a:buAutoNum type="arabicPeriod"/>
             </a:pPr>
             <a:r>
-              <a:rPr lang="en-US" dirty="0" err="1" smtClean="0"/>
-              <a:t>Hadoop</a:t>
-            </a:r>
-            <a:r>
               <a:rPr lang="en-US" dirty="0" smtClean="0"/>
-              <a:t> </a:t>
-            </a:r>
-            <a:r>
-              <a:rPr lang="en-US" dirty="0" err="1" smtClean="0"/>
-              <a:t>MapReduce</a:t>
-            </a:r>
-            <a:r>
-              <a:rPr lang="en-US" dirty="0" smtClean="0"/>
-              <a:t>	</a:t>
+              <a:t>Hadoop MapReduce	</a:t>
             </a:r>
           </a:p>
           <a:p>
@@ -13760,33 +13989,20 @@
               <a:t>Up to 100x faster than </a:t>
             </a:r>
             <a:r>
-              <a:rPr lang="en-US" dirty="0" err="1" smtClean="0"/>
-              <a:t>mapreduce</a:t>
-            </a:r>
-            <a:r>
               <a:rPr lang="en-US" dirty="0" smtClean="0"/>
-              <a:t> when data fits in memory and 10x if it spills over disk</a:t>
+              <a:t>mapreduce </a:t>
+            </a:r>
+            <a:r>
+              <a:rPr lang="en-US" dirty="0" smtClean="0"/>
+              <a:t>when data fits in memory and 10x if it spills over disk</a:t>
             </a:r>
           </a:p>
           <a:p>
             <a:pPr lvl="3"/>
             <a:r>
               <a:rPr lang="en-US" dirty="0" smtClean="0"/>
-              <a:t>Considered as a replacement for </a:t>
-            </a:r>
-            <a:r>
-              <a:rPr lang="en-US" dirty="0" err="1" smtClean="0"/>
-              <a:t>Hadoop</a:t>
-            </a:r>
-            <a:r>
-              <a:rPr lang="en-US" dirty="0" smtClean="0"/>
-              <a:t> </a:t>
-            </a:r>
-            <a:r>
-              <a:rPr lang="en-US" dirty="0" err="1" smtClean="0"/>
-              <a:t>mapreduce</a:t>
-            </a:r>
-            <a:endParaRPr lang="en-US" dirty="0" smtClean="0"/>
+              <a:t>Considered as a replacement for Hadoop mapreduce</a:t>
+            </a:r>
           </a:p>
           <a:p>
             <a:pPr marL="539750" lvl="3" indent="0">
@@ -13850,6 +14066,13 @@
   <p:transition xmlns:p14="http://schemas.microsoft.com/office/powerpoint/2010/main">
     <p:pull dir="r"/>
   </p:transition>
+  <p:timing>
+    <p:tnLst>
+      <p:par>
+        <p:cTn xmlns:p14="http://schemas.microsoft.com/office/powerpoint/2010/main" id="1" dur="indefinite" restart="never" nodeType="tmRoot"/>
+      </p:par>
+    </p:tnLst>
+  </p:timing>
 </p:sld>
 </file>
 
@@ -13910,63 +14133,107 @@
           <a:lstStyle/>
           <a:p>
             <a:r>
+              <a:rPr lang="en-US" dirty="0"/>
+              <a:t>The </a:t>
+            </a:r>
+            <a:r>
               <a:rPr lang="en-US" dirty="0" smtClean="0"/>
-              <a:t>Types of Algorithm Classes in KNN Algorithms</a:t>
+              <a:t>Primary focus: To reduce </a:t>
+            </a:r>
+            <a:r>
+              <a:rPr lang="en-US" dirty="0"/>
+              <a:t>the number of distance computation. </a:t>
+            </a:r>
+            <a:endParaRPr lang="en-US" dirty="0" smtClean="0"/>
+          </a:p>
+          <a:p>
+            <a:r>
+              <a:rPr lang="en-US" dirty="0" smtClean="0"/>
+              <a:t>Mostly Focused on Centralized Algorithm</a:t>
+            </a:r>
+          </a:p>
+          <a:p>
+            <a:r>
+              <a:rPr lang="en-US" dirty="0" smtClean="0"/>
+              <a:t>So far one research for Distributed Algorithm (for Hadoop Mapreduce</a:t>
+            </a:r>
+            <a:r>
+              <a:rPr lang="en-US" dirty="0"/>
+              <a:t>)</a:t>
+            </a:r>
+          </a:p>
+          <a:p>
+            <a:r>
+              <a:rPr lang="en-US" dirty="0" smtClean="0"/>
+              <a:t>We can group all the algorithm into two groups</a:t>
+            </a:r>
+            <a:endParaRPr lang="en-US" dirty="0" smtClean="0"/>
+          </a:p>
+          <a:p>
+            <a:pPr lvl="2"/>
+            <a:r>
+              <a:rPr lang="en-US" dirty="0" smtClean="0"/>
+              <a:t>Index based</a:t>
+            </a:r>
+            <a:endParaRPr lang="en-US" dirty="0" smtClean="0"/>
+          </a:p>
+          <a:p>
+            <a:pPr lvl="2"/>
+            <a:r>
+              <a:rPr lang="en-US" dirty="0" smtClean="0"/>
+              <a:t>Partitio</a:t>
+            </a:r>
+            <a:r>
+              <a:rPr lang="en-US" dirty="0" smtClean="0"/>
+              <a:t>n based</a:t>
+            </a:r>
+            <a:endParaRPr lang="en-US" dirty="0"/>
+          </a:p>
+          <a:p>
+            <a:r>
+              <a:rPr lang="en-US" dirty="0" smtClean="0"/>
+              <a:t>Index Based </a:t>
             </a:r>
           </a:p>
           <a:p>
             <a:pPr lvl="1"/>
             <a:r>
               <a:rPr lang="en-US" dirty="0" smtClean="0"/>
-              <a:t>Indexing</a:t>
+              <a:t>Primarily for single node </a:t>
             </a:r>
           </a:p>
           <a:p>
             <a:pPr lvl="1"/>
             <a:r>
               <a:rPr lang="en-US" dirty="0" smtClean="0"/>
-              <a:t>Partitioning</a:t>
+              <a:t>For high dimensions index does not work</a:t>
             </a:r>
           </a:p>
           <a:p>
             <a:r>
               <a:rPr lang="en-US" dirty="0" smtClean="0"/>
-              <a:t>All these algorithms focus on reducing the number of distanc</a:t>
-            </a:r>
+              <a:t>Partition Based</a:t>
+            </a:r>
+          </a:p>
+          <a:p>
+            <a:pPr lvl="1"/>
             <a:r>
               <a:rPr lang="en-US" dirty="0" smtClean="0"/>
-              <a:t>e computation</a:t>
-            </a:r>
-            <a:endParaRPr lang="en-US" dirty="0"/>
-          </a:p>
-          <a:p>
+              <a:t>Primarily fo</a:t>
+            </a:r>
             <a:r>
               <a:rPr lang="en-US" dirty="0" smtClean="0"/>
-              <a:t>The algorithms are primarily for centralized environment</a:t>
-            </a:r>
-          </a:p>
-          <a:p>
+              <a:t>r single node</a:t>
+            </a:r>
+            <a:endParaRPr lang="en-US" dirty="0" smtClean="0"/>
+          </a:p>
+          <a:p>
+            <a:pPr lvl="1"/>
             <a:r>
               <a:rPr lang="en-US" dirty="0" smtClean="0"/>
-              <a:t>Until now there is only one research which focused on </a:t>
-            </a:r>
-            <a:r>
-              <a:rPr lang="en-US" dirty="0" err="1" smtClean="0"/>
-              <a:t>hadoop</a:t>
-            </a:r>
-            <a:r>
-              <a:rPr lang="en-US" dirty="0" smtClean="0"/>
-              <a:t> </a:t>
-            </a:r>
-            <a:r>
-              <a:rPr lang="en-US" dirty="0" err="1" smtClean="0"/>
-              <a:t>mapreduce</a:t>
-            </a:r>
-            <a:r>
-              <a:rPr lang="en-US" dirty="0" smtClean="0"/>
-              <a:t>. </a:t>
-            </a:r>
-            <a:endParaRPr lang="en-US" dirty="0"/>
+              <a:t>For distributed clusters Involves lot of data replication</a:t>
+            </a:r>
+            <a:endParaRPr lang="en-US" dirty="0" smtClean="0"/>
           </a:p>
         </p:txBody>
       </p:sp>
@@ -14007,6 +14274,13 @@
   <p:transition xmlns:p14="http://schemas.microsoft.com/office/powerpoint/2010/main">
     <p:pull dir="r"/>
   </p:transition>
+  <p:timing>
+    <p:tnLst>
+      <p:par>
+        <p:cTn xmlns:p14="http://schemas.microsoft.com/office/powerpoint/2010/main" id="1" dur="indefinite" restart="never" nodeType="tmRoot"/>
+      </p:par>
+    </p:tnLst>
+  </p:timing>
 </p:sld>
 </file>
 
@@ -14042,9 +14316,10 @@
           <a:bodyPr/>
           <a:lstStyle/>
           <a:p>
+            <a:pPr algn="ctr"/>
             <a:r>
               <a:rPr lang="en-US" dirty="0" smtClean="0"/>
-              <a:t>Problem Statement</a:t>
+              <a:t>Contribution</a:t>
             </a:r>
             <a:endParaRPr lang="en-US" dirty="0"/>
           </a:p>
@@ -14065,22 +14340,108 @@
           <a:bodyPr/>
           <a:lstStyle/>
           <a:p>
+            <a:r>
+              <a:rPr lang="en-US" dirty="0"/>
+              <a:t>We have taken some of the concepts like</a:t>
+            </a:r>
+          </a:p>
+          <a:p>
+            <a:pPr lvl="1"/>
+            <a:r>
+              <a:rPr lang="en-US" dirty="0"/>
+              <a:t>Voronoi Partitioning </a:t>
+            </a:r>
+            <a:r>
+              <a:rPr lang="en-US" baseline="30000" dirty="0"/>
+              <a:t>1</a:t>
+            </a:r>
+            <a:endParaRPr lang="en-US" dirty="0"/>
+          </a:p>
+          <a:p>
+            <a:pPr lvl="1"/>
+            <a:r>
+              <a:rPr lang="en-US" dirty="0"/>
+              <a:t>Triangle Inequality for multidimensional points </a:t>
+            </a:r>
+            <a:r>
+              <a:rPr lang="en-US" baseline="30000" dirty="0" smtClean="0"/>
+              <a:t>2</a:t>
+            </a:r>
             <a:endParaRPr lang="en-US" dirty="0" smtClean="0"/>
           </a:p>
           <a:p>
             <a:r>
               <a:rPr lang="en-US" dirty="0" smtClean="0"/>
-              <a:t>How to get Better KNN Performance for huge Datasets ?</a:t>
-            </a:r>
-          </a:p>
-          <a:p>
+              <a:t>Using them we have Designed an algorithm which is </a:t>
+            </a:r>
+          </a:p>
+          <a:p>
+            <a:pPr lvl="1"/>
+            <a:r>
+              <a:rPr lang="en-US" dirty="0" smtClean="0"/>
+              <a:t>Distributed</a:t>
+            </a:r>
+          </a:p>
+          <a:p>
+            <a:pPr lvl="1"/>
+            <a:r>
+              <a:rPr lang="en-US" dirty="0" smtClean="0"/>
+              <a:t>optimized </a:t>
+            </a:r>
+            <a:r>
+              <a:rPr lang="en-US" dirty="0"/>
+              <a:t>for spark Framework </a:t>
+            </a:r>
             <a:endParaRPr lang="en-US" dirty="0" smtClean="0"/>
           </a:p>
           <a:p>
-            <a:pPr marL="0" indent="0">
-              <a:buNone/>
-            </a:pPr>
+            <a:pPr lvl="1"/>
+            <a:r>
+              <a:rPr lang="en-US" dirty="0"/>
+              <a:t>I</a:t>
+            </a:r>
+            <a:r>
+              <a:rPr lang="en-US" dirty="0" smtClean="0"/>
+              <a:t>terative and incremental algorithm </a:t>
+            </a:r>
+          </a:p>
+          <a:p>
+            <a:pPr lvl="1"/>
+            <a:r>
+              <a:rPr lang="en-US" dirty="0" smtClean="0"/>
+              <a:t>Minimalistic in data replication which in turn reduces disk and memory usage</a:t>
+            </a:r>
+          </a:p>
+          <a:p>
+            <a:pPr lvl="1"/>
+            <a:r>
+              <a:rPr lang="en-US" dirty="0" smtClean="0"/>
+              <a:t>Effective and scalable for large and multidimensional dataset</a:t>
+            </a:r>
+          </a:p>
+          <a:p>
+            <a:r>
+              <a:rPr lang="en-US" dirty="0" smtClean="0"/>
+              <a:t>Studied the effects of various parameters on running time, Memory, Disk Usage</a:t>
+            </a:r>
+          </a:p>
+          <a:p>
+            <a:pPr lvl="1"/>
             <a:endParaRPr lang="en-US" dirty="0" smtClean="0"/>
+          </a:p>
+          <a:p>
+            <a:endParaRPr lang="en-US" dirty="0" smtClean="0"/>
+          </a:p>
+          <a:p>
+            <a:pPr lvl="1"/>
+            <a:endParaRPr lang="en-US" dirty="0" smtClean="0"/>
+          </a:p>
+          <a:p>
+            <a:pPr lvl="1"/>
+            <a:endParaRPr lang="en-US" dirty="0" smtClean="0"/>
+          </a:p>
+          <a:p>
+            <a:endParaRPr lang="en-US" dirty="0"/>
           </a:p>
         </p:txBody>
       </p:sp>
@@ -14111,7 +14472,7 @@
     </p:spTree>
     <p:extLst>
       <p:ext uri="{BB962C8B-B14F-4D97-AF65-F5344CB8AC3E}">
-        <p14:creationId xmlns:p14="http://schemas.microsoft.com/office/powerpoint/2010/main" val="364334680"/>
+        <p14:creationId xmlns:p14="http://schemas.microsoft.com/office/powerpoint/2010/main" val="1107260484"/>
       </p:ext>
     </p:extLst>
   </p:cSld>
@@ -14222,41 +14583,39 @@
           </a:p>
           <a:p>
             <a:r>
+              <a:rPr lang="en-US" dirty="0" smtClean="0"/>
+              <a:t>Solution:</a:t>
+            </a:r>
+            <a:endParaRPr lang="en-US" dirty="0"/>
+          </a:p>
+          <a:p>
+            <a:pPr lvl="1"/>
+            <a:r>
+              <a:rPr lang="en-US" dirty="0" smtClean="0"/>
+              <a:t>Voronoi Partition </a:t>
+            </a:r>
+            <a:r>
               <a:rPr lang="en-US" dirty="0"/>
-              <a:t>Solution:</a:t>
+              <a:t>Based </a:t>
+            </a:r>
+            <a:r>
+              <a:rPr lang="en-US" dirty="0" smtClean="0"/>
+              <a:t>iterative algorithm designed for Spark Framework</a:t>
             </a:r>
           </a:p>
           <a:p>
             <a:pPr lvl="1"/>
             <a:r>
-              <a:rPr lang="en-US" dirty="0"/>
-              <a:t>Partition Based algorithm designed for Spark </a:t>
-            </a:r>
-            <a:r>
               <a:rPr lang="en-US" dirty="0" smtClean="0"/>
-              <a:t>Framework</a:t>
-            </a:r>
-          </a:p>
-          <a:p>
-            <a:pPr lvl="1"/>
-            <a:r>
-              <a:rPr lang="en-US" dirty="0"/>
-              <a:t>Our algorithm is an iterative algorithm and </a:t>
-            </a:r>
-            <a:r>
-              <a:rPr lang="en-US" dirty="0" err="1"/>
-              <a:t>mapreduce</a:t>
-            </a:r>
-            <a:r>
-              <a:rPr lang="en-US"/>
-              <a:t> does not do well in such scenarios. </a:t>
-            </a:r>
-          </a:p>
-          <a:p>
-            <a:pPr lvl="1"/>
-            <a:endParaRPr lang="en-US" dirty="0"/>
-          </a:p>
-          <a:p>
+              <a:t>We look for neighbors of a test vector only from a limited subset of partitions</a:t>
+            </a:r>
+            <a:endParaRPr lang="en-US" dirty="0" smtClean="0"/>
+          </a:p>
+          <a:p>
+            <a:r>
+              <a:rPr lang="en-US" dirty="0" smtClean="0"/>
+              <a:t> </a:t>
+            </a:r>
             <a:endParaRPr lang="en-US" dirty="0"/>
           </a:p>
         </p:txBody>
@@ -14298,6 +14657,13 @@
   <p:transition xmlns:p14="http://schemas.microsoft.com/office/powerpoint/2010/main">
     <p:pull dir="r"/>
   </p:transition>
+  <p:timing>
+    <p:tnLst>
+      <p:par>
+        <p:cTn xmlns:p14="http://schemas.microsoft.com/office/powerpoint/2010/main" id="1" dur="indefinite" restart="never" nodeType="tmRoot"/>
+      </p:par>
+    </p:tnLst>
+  </p:timing>
 </p:sld>
 </file>
 
@@ -14362,17 +14728,8 @@
             </a:pPr>
             <a:r>
               <a:rPr lang="en-US" dirty="0" smtClean="0"/>
-              <a:t>Partition </a:t>
-            </a:r>
-            <a:r>
-              <a:rPr lang="en-US" dirty="0" smtClean="0"/>
-              <a:t>R (Test Dataset) and S(Training Dataset) into partitions with same pivots as a center in both R and </a:t>
-            </a:r>
-            <a:r>
-              <a:rPr lang="en-US" dirty="0" smtClean="0"/>
-              <a:t>S. Partition should not be too large or too small.</a:t>
-            </a:r>
-            <a:endParaRPr lang="en-US" dirty="0" smtClean="0"/>
+              <a:t>Partition both R and S dataset using common pivots from S dataset</a:t>
+            </a:r>
           </a:p>
           <a:p>
             <a:pPr marL="457200" indent="-457200">
@@ -14381,13 +14738,12 @@
             </a:pPr>
             <a:r>
               <a:rPr lang="en-US" dirty="0" smtClean="0"/>
-              <a:t>We are leveraging the neat idea that except for point near the edge of the partition, most data should be able to find its neighbor within a single </a:t>
+              <a:t>Except for </a:t>
             </a:r>
             <a:r>
               <a:rPr lang="en-US" dirty="0" smtClean="0"/>
-              <a:t>partition. </a:t>
-            </a:r>
-            <a:endParaRPr lang="en-US" dirty="0" smtClean="0"/>
+              <a:t>point near the edge of the partition, most data should be able to find its neighbor within a single partition. </a:t>
+            </a:r>
           </a:p>
           <a:p>
             <a:pPr marL="457200" indent="-457200">
@@ -14396,11 +14752,19 @@
             </a:pPr>
             <a:r>
               <a:rPr lang="en-US" dirty="0" smtClean="0"/>
-              <a:t>We do a self Join of a Partition in R with same partition in S. Find all the neighbors for data in the middle of the </a:t>
+              <a:t>For every partition in R we find nearest neighbor within same partition in S. If the point </a:t>
             </a:r>
             <a:r>
               <a:rPr lang="en-US" dirty="0" smtClean="0"/>
-              <a:t>partition. For all such points KNN computation is complete.</a:t>
+              <a:t>in R is at the center of the partition then </a:t>
+            </a:r>
+            <a:r>
+              <a:rPr lang="en-US" dirty="0"/>
+              <a:t>f</a:t>
+            </a:r>
+            <a:r>
+              <a:rPr lang="en-US" dirty="0" smtClean="0"/>
+              <a:t>or all such points KNN computation is complete.</a:t>
             </a:r>
             <a:endParaRPr lang="en-US" dirty="0" smtClean="0"/>
           </a:p>
@@ -14411,35 +14775,28 @@
             </a:pPr>
             <a:r>
               <a:rPr lang="en-US" dirty="0" smtClean="0"/>
-              <a:t>For data </a:t>
+              <a:t>For </a:t>
             </a:r>
             <a:r>
               <a:rPr lang="en-US" dirty="0" smtClean="0"/>
-              <a:t>points on </a:t>
+              <a:t>all data </a:t>
             </a:r>
             <a:r>
               <a:rPr lang="en-US" dirty="0" smtClean="0"/>
-              <a:t>the edge, we find all the nearby </a:t>
+              <a:t>points on the edge, we </a:t>
             </a:r>
             <a:r>
               <a:rPr lang="en-US" dirty="0" smtClean="0"/>
-              <a:t>partition which might contain a nearest neighbor </a:t>
+              <a:t>check all </a:t>
             </a:r>
             <a:r>
               <a:rPr lang="en-US" dirty="0" smtClean="0"/>
-              <a:t>and </a:t>
+              <a:t>the nearby </a:t>
             </a:r>
             <a:r>
               <a:rPr lang="en-US" dirty="0" smtClean="0"/>
-              <a:t>check those partitions as well. We check all such partition and update the KNN results for those points</a:t>
-            </a:r>
-            <a:endParaRPr lang="en-US" dirty="0" smtClean="0"/>
-          </a:p>
-          <a:p>
-            <a:pPr marL="457200" indent="-457200">
-              <a:buFont typeface="+mj-lt"/>
-              <a:buAutoNum type="arabicPeriod"/>
-            </a:pPr>
+              <a:t>partitions and find nearest neighbors if present in it. </a:t>
+            </a:r>
             <a:endParaRPr lang="en-US" dirty="0" smtClean="0"/>
           </a:p>
         </p:txBody>
@@ -14481,6 +14838,13 @@
   <p:transition xmlns:p14="http://schemas.microsoft.com/office/powerpoint/2010/main">
     <p:pull dir="r"/>
   </p:transition>
+  <p:timing>
+    <p:tnLst>
+      <p:par>
+        <p:cTn xmlns:p14="http://schemas.microsoft.com/office/powerpoint/2010/main" id="1" dur="indefinite" restart="never" nodeType="tmRoot"/>
+      </p:par>
+    </p:tnLst>
+  </p:timing>
 </p:sld>
 </file>
 

</xml_diff>

<commit_message>
Adding changes to upated version of ppt and latex template
</commit_message>
<xml_diff>
--- a/Thesis-Presentation_v1.pptx
+++ b/Thesis-Presentation_v1.pptx
@@ -322,7 +322,7 @@
               <a:pPr>
                 <a:defRPr/>
               </a:pPr>
-              <a:t>29/10/15</a:t>
+              <a:t>3/11/15</a:t>
             </a:fld>
             <a:endParaRPr lang="en-AU"/>
           </a:p>
@@ -10646,7 +10646,7 @@
           <a:lstStyle/>
           <a:p>
             <a:r>
-              <a:rPr lang="en-US" dirty="0"/>
+              <a:rPr lang="en-US" smtClean="0"/>
               <a:t>Efficient KNN Join Algorithm for spark</a:t>
             </a:r>
             <a:endParaRPr lang="en-AU" dirty="0"/>
@@ -10982,7 +10982,6 @@
               <a:rPr lang="en-US" sz="1800" dirty="0" smtClean="0"/>
               <a:t>Select Random Pivots</a:t>
             </a:r>
-            <a:endParaRPr lang="en-US" sz="1800" dirty="0" smtClean="0"/>
           </a:p>
           <a:p>
             <a:pPr marL="342900" indent="-342900">
@@ -10991,13 +10990,8 @@
             </a:pPr>
             <a:r>
               <a:rPr lang="en-US" sz="1800" dirty="0" smtClean="0"/>
-              <a:t>Assign </a:t>
-            </a:r>
-            <a:r>
-              <a:rPr lang="en-US" sz="1800" dirty="0" smtClean="0"/>
-              <a:t>vectors in both Training and Test Dataset to closest pivots. All vectors belonging to a pivot form a partition. </a:t>
-            </a:r>
-            <a:endParaRPr lang="en-US" sz="1800" dirty="0" smtClean="0"/>
+              <a:t>Assign vectors in both Training and Test Dataset to closest pivots. All vectors belonging to a pivot form a partition. </a:t>
+            </a:r>
           </a:p>
           <a:p>
             <a:pPr marL="342900" indent="-342900">
@@ -11006,11 +11000,7 @@
             </a:pPr>
             <a:r>
               <a:rPr lang="en-US" sz="1800" dirty="0" smtClean="0"/>
-              <a:t>The </a:t>
-            </a:r>
-            <a:r>
-              <a:rPr lang="en-US" sz="1800" dirty="0" smtClean="0"/>
-              <a:t>partition data is stored in spark as a tuple of the form (</a:t>
+              <a:t>The partition data is stored in spark as a tuple of the form (</a:t>
             </a:r>
             <a:r>
               <a:rPr lang="en-US" sz="1800" dirty="0" err="1" smtClean="0"/>
@@ -11018,11 +11008,7 @@
             </a:r>
             <a:r>
               <a:rPr lang="en-US" sz="1800" dirty="0" smtClean="0"/>
-              <a:t>, List(vectors)</a:t>
-            </a:r>
-            <a:r>
-              <a:rPr lang="en-US" sz="1800" dirty="0" smtClean="0"/>
-              <a:t>)</a:t>
+              <a:t>, List(vectors))</a:t>
             </a:r>
           </a:p>
           <a:p>
@@ -11178,15 +11164,7 @@
             </a:pPr>
             <a:r>
               <a:rPr lang="en-US" sz="1600" dirty="0" smtClean="0"/>
-              <a:t>Else Move vector to another closest partition and </a:t>
-            </a:r>
-            <a:r>
-              <a:rPr lang="en-US" sz="1600" dirty="0" smtClean="0"/>
-              <a:t>find </a:t>
-            </a:r>
-            <a:r>
-              <a:rPr lang="en-US" sz="1600" dirty="0" smtClean="0"/>
-              <a:t>and update neighbors</a:t>
+              <a:t>Else Move vector to another closest partition and find and update neighbors</a:t>
             </a:r>
           </a:p>
           <a:p>
@@ -11196,11 +11174,7 @@
             </a:pPr>
             <a:r>
               <a:rPr lang="en-US" sz="1600" dirty="0" smtClean="0"/>
-              <a:t>Repeat </a:t>
-            </a:r>
-            <a:r>
-              <a:rPr lang="en-US" sz="1600" dirty="0" smtClean="0"/>
-              <a:t>until we find KNN for all the test vectors</a:t>
+              <a:t>Repeat until we find KNN for all the test vectors</a:t>
             </a:r>
             <a:endParaRPr lang="en-US" sz="1600" dirty="0"/>
           </a:p>
@@ -13528,11 +13502,7 @@
           <a:p>
             <a:r>
               <a:rPr lang="en-AU" dirty="0" smtClean="0"/>
-              <a:t>In KNN </a:t>
-            </a:r>
-            <a:r>
-              <a:rPr lang="en-AU" dirty="0" smtClean="0"/>
-              <a:t>Join, for every vector in </a:t>
+              <a:t>In KNN Join, for every vector in </a:t>
             </a:r>
             <a:r>
               <a:rPr lang="en-AU" dirty="0"/>
@@ -13564,19 +13534,7 @@
             </a:r>
             <a:r>
               <a:rPr lang="en-AU" dirty="0" smtClean="0"/>
-              <a:t>], we find</a:t>
-            </a:r>
-            <a:r>
-              <a:rPr lang="en-AU" dirty="0" smtClean="0"/>
-              <a:t> </a:t>
-            </a:r>
-            <a:r>
-              <a:rPr lang="en-AU" dirty="0" smtClean="0"/>
-              <a:t>K nearest vectors in Training data [</a:t>
-            </a:r>
-            <a:r>
-              <a:rPr lang="en-AU" dirty="0" smtClean="0"/>
-              <a:t>v</a:t>
+              <a:t>], we find K nearest vectors in Training data [v</a:t>
             </a:r>
             <a:r>
               <a:rPr lang="en-AU" baseline="-25000" dirty="0" smtClean="0"/>
@@ -13592,11 +13550,7 @@
             </a:r>
             <a:r>
               <a:rPr lang="en-AU" dirty="0" smtClean="0"/>
-              <a:t> </a:t>
-            </a:r>
-            <a:r>
-              <a:rPr lang="en-AU" dirty="0" smtClean="0"/>
-              <a:t>… </a:t>
+              <a:t> … </a:t>
             </a:r>
             <a:r>
               <a:rPr lang="en-AU" dirty="0" err="1" smtClean="0"/>
@@ -13608,11 +13562,7 @@
             </a:r>
             <a:r>
               <a:rPr lang="en-AU" dirty="0" smtClean="0"/>
-              <a:t>] </a:t>
-            </a:r>
-            <a:r>
-              <a:rPr lang="en-AU" dirty="0" smtClean="0"/>
-              <a:t>and classify </a:t>
+              <a:t>] and classify </a:t>
             </a:r>
             <a:r>
               <a:rPr lang="en-AU" dirty="0" err="1" smtClean="0"/>
@@ -13624,29 +13574,13 @@
             </a:r>
             <a:r>
               <a:rPr lang="en-AU" dirty="0" smtClean="0"/>
-              <a:t> </a:t>
-            </a:r>
+              <a:t> based on neighbour vectors’ class.</a:t>
+            </a:r>
+          </a:p>
+          <a:p>
             <a:r>
               <a:rPr lang="en-AU" dirty="0" smtClean="0"/>
-              <a:t>based on </a:t>
-            </a:r>
-            <a:r>
-              <a:rPr lang="en-AU" dirty="0" smtClean="0"/>
-              <a:t>neighbour vectors</a:t>
-            </a:r>
-            <a:r>
-              <a:rPr lang="en-AU" dirty="0" smtClean="0"/>
-              <a:t>’ class.</a:t>
-            </a:r>
-          </a:p>
-          <a:p>
-            <a:r>
-              <a:rPr lang="en-AU" dirty="0" smtClean="0"/>
-              <a:t>Applications</a:t>
-            </a:r>
-            <a:r>
-              <a:rPr lang="en-AU" dirty="0" smtClean="0"/>
-              <a:t>: </a:t>
+              <a:t>Applications: </a:t>
             </a:r>
           </a:p>
           <a:p>
@@ -13673,11 +13607,7 @@
             <a:pPr lvl="1"/>
             <a:r>
               <a:rPr lang="en-AU" dirty="0" smtClean="0"/>
-              <a:t>High Computational Complexity  =&gt; Not usable for big </a:t>
-            </a:r>
-            <a:r>
-              <a:rPr lang="en-AU" dirty="0" smtClean="0"/>
-              <a:t>datasets</a:t>
+              <a:t>High Computational Complexity  =&gt; Not usable for big datasets</a:t>
             </a:r>
           </a:p>
           <a:p>
@@ -13805,11 +13735,7 @@
             </a:pPr>
             <a:r>
               <a:rPr lang="en-US" dirty="0" smtClean="0"/>
-              <a:t>Better Algorithm with lower computational </a:t>
-            </a:r>
-            <a:r>
-              <a:rPr lang="en-US" dirty="0" smtClean="0"/>
-              <a:t>complexity </a:t>
+              <a:t>Better Algorithm with lower computational complexity </a:t>
             </a:r>
           </a:p>
           <a:p>
@@ -13986,15 +13912,7 @@
             <a:pPr lvl="3"/>
             <a:r>
               <a:rPr lang="en-US" dirty="0" smtClean="0"/>
-              <a:t>Up to 100x faster than </a:t>
-            </a:r>
-            <a:r>
-              <a:rPr lang="en-US" dirty="0" smtClean="0"/>
-              <a:t>mapreduce </a:t>
-            </a:r>
-            <a:r>
-              <a:rPr lang="en-US" dirty="0" smtClean="0"/>
-              <a:t>when data fits in memory and 10x if it spills over disk</a:t>
+              <a:t>Up to 100x faster than mapreduce when data fits in memory and 10x if it spills over disk</a:t>
             </a:r>
           </a:p>
           <a:p>
@@ -14167,7 +14085,6 @@
               <a:rPr lang="en-US" dirty="0" smtClean="0"/>
               <a:t>We can group all the algorithm into two groups</a:t>
             </a:r>
-            <a:endParaRPr lang="en-US" dirty="0" smtClean="0"/>
           </a:p>
           <a:p>
             <a:pPr lvl="2"/>
@@ -14175,17 +14092,12 @@
               <a:rPr lang="en-US" dirty="0" smtClean="0"/>
               <a:t>Index based</a:t>
             </a:r>
-            <a:endParaRPr lang="en-US" dirty="0" smtClean="0"/>
           </a:p>
           <a:p>
             <a:pPr lvl="2"/>
             <a:r>
               <a:rPr lang="en-US" dirty="0" smtClean="0"/>
-              <a:t>Partitio</a:t>
-            </a:r>
-            <a:r>
-              <a:rPr lang="en-US" dirty="0" smtClean="0"/>
-              <a:t>n based</a:t>
+              <a:t>Partition based</a:t>
             </a:r>
             <a:endParaRPr lang="en-US" dirty="0"/>
           </a:p>
@@ -14219,13 +14131,8 @@
             <a:pPr lvl="1"/>
             <a:r>
               <a:rPr lang="en-US" dirty="0" smtClean="0"/>
-              <a:t>Primarily fo</a:t>
-            </a:r>
-            <a:r>
-              <a:rPr lang="en-US" dirty="0" smtClean="0"/>
-              <a:t>r single node</a:t>
-            </a:r>
-            <a:endParaRPr lang="en-US" dirty="0" smtClean="0"/>
+              <a:t>Primarily for single node</a:t>
+            </a:r>
           </a:p>
           <a:p>
             <a:pPr lvl="1"/>
@@ -14233,7 +14140,6 @@
               <a:rPr lang="en-US" dirty="0" smtClean="0"/>
               <a:t>For distributed clusters Involves lot of data replication</a:t>
             </a:r>
-            <a:endParaRPr lang="en-US" dirty="0" smtClean="0"/>
           </a:p>
         </p:txBody>
       </p:sp>
@@ -14609,7 +14515,6 @@
               <a:rPr lang="en-US" dirty="0" smtClean="0"/>
               <a:t>We look for neighbors of a test vector only from a limited subset of partitions</a:t>
             </a:r>
-            <a:endParaRPr lang="en-US" dirty="0" smtClean="0"/>
           </a:p>
           <a:p>
             <a:r>
@@ -14738,11 +14643,7 @@
             </a:pPr>
             <a:r>
               <a:rPr lang="en-US" dirty="0" smtClean="0"/>
-              <a:t>Except for </a:t>
-            </a:r>
-            <a:r>
-              <a:rPr lang="en-US" dirty="0" smtClean="0"/>
-              <a:t>point near the edge of the partition, most data should be able to find its neighbor within a single partition. </a:t>
+              <a:t>Except for point near the edge of the partition, most data should be able to find its neighbor within a single partition. </a:t>
             </a:r>
           </a:p>
           <a:p>
@@ -14752,11 +14653,7 @@
             </a:pPr>
             <a:r>
               <a:rPr lang="en-US" dirty="0" smtClean="0"/>
-              <a:t>For every partition in R we find nearest neighbor within same partition in S. If the point </a:t>
-            </a:r>
-            <a:r>
-              <a:rPr lang="en-US" dirty="0" smtClean="0"/>
-              <a:t>in R is at the center of the partition then </a:t>
+              <a:t>For every partition in R we find nearest neighbor within same partition in S. If the point in R is at the center of the partition then </a:t>
             </a:r>
             <a:r>
               <a:rPr lang="en-US" dirty="0"/>
@@ -14766,7 +14663,6 @@
               <a:rPr lang="en-US" dirty="0" smtClean="0"/>
               <a:t>or all such points KNN computation is complete.</a:t>
             </a:r>
-            <a:endParaRPr lang="en-US" dirty="0" smtClean="0"/>
           </a:p>
           <a:p>
             <a:pPr marL="457200" indent="-457200">
@@ -14775,29 +14671,8 @@
             </a:pPr>
             <a:r>
               <a:rPr lang="en-US" dirty="0" smtClean="0"/>
-              <a:t>For </a:t>
-            </a:r>
-            <a:r>
-              <a:rPr lang="en-US" dirty="0" smtClean="0"/>
-              <a:t>all data </a:t>
-            </a:r>
-            <a:r>
-              <a:rPr lang="en-US" dirty="0" smtClean="0"/>
-              <a:t>points on the edge, we </a:t>
-            </a:r>
-            <a:r>
-              <a:rPr lang="en-US" dirty="0" smtClean="0"/>
-              <a:t>check all </a:t>
-            </a:r>
-            <a:r>
-              <a:rPr lang="en-US" dirty="0" smtClean="0"/>
-              <a:t>the nearby </a:t>
-            </a:r>
-            <a:r>
-              <a:rPr lang="en-US" dirty="0" smtClean="0"/>
-              <a:t>partitions and find nearest neighbors if present in it. </a:t>
-            </a:r>
-            <a:endParaRPr lang="en-US" dirty="0" smtClean="0"/>
+              <a:t>For all data points on the edge, we check all the nearby partitions and find nearest neighbors if present in it. </a:t>
+            </a:r>
           </a:p>
         </p:txBody>
       </p:sp>

</xml_diff>